<commit_message>
Updating preso with more content
</commit_message>
<xml_diff>
--- a/Presentation/BFF - Neo4j.pptx
+++ b/Presentation/BFF - Neo4j.pptx
@@ -5,7 +5,7 @@
     <p:sldMasterId id="2147483660" r:id="rId5"/>
   </p:sldMasterIdLst>
   <p:notesMasterIdLst>
-    <p:notesMasterId r:id="rId23"/>
+    <p:notesMasterId r:id="rId24"/>
   </p:notesMasterIdLst>
   <p:sldIdLst>
     <p:sldId id="291" r:id="rId6"/>
@@ -17,14 +17,15 @@
     <p:sldId id="341" r:id="rId12"/>
     <p:sldId id="335" r:id="rId13"/>
     <p:sldId id="345" r:id="rId14"/>
-    <p:sldId id="339" r:id="rId15"/>
-    <p:sldId id="344" r:id="rId16"/>
-    <p:sldId id="340" r:id="rId17"/>
-    <p:sldId id="334" r:id="rId18"/>
-    <p:sldId id="347" r:id="rId19"/>
-    <p:sldId id="346" r:id="rId20"/>
-    <p:sldId id="348" r:id="rId21"/>
-    <p:sldId id="274" r:id="rId22"/>
+    <p:sldId id="349" r:id="rId15"/>
+    <p:sldId id="339" r:id="rId16"/>
+    <p:sldId id="344" r:id="rId17"/>
+    <p:sldId id="340" r:id="rId18"/>
+    <p:sldId id="334" r:id="rId19"/>
+    <p:sldId id="347" r:id="rId20"/>
+    <p:sldId id="346" r:id="rId21"/>
+    <p:sldId id="348" r:id="rId22"/>
+    <p:sldId id="274" r:id="rId23"/>
   </p:sldIdLst>
   <p:sldSz cx="12192000" cy="6858000"/>
   <p:notesSz cx="6858000" cy="9144000"/>
@@ -224,7 +225,7 @@
           <a:p>
             <a:fld id="{FDAF5FA2-515A-4E71-85FB-EEE31BD88948}" type="datetimeFigureOut">
               <a:rPr lang="en-US" smtClean="0"/>
-              <a:t>3/30/2016</a:t>
+              <a:t>3/31/2016</a:t>
             </a:fld>
             <a:endParaRPr lang="en-US"/>
           </a:p>
@@ -694,7 +695,7 @@
           <a:p>
             <a:fld id="{9FAC47D1-AAA4-4021-BBD5-64F096EA128A}" type="slidenum">
               <a:rPr lang="en-US" smtClean="0"/>
-              <a:t>14</a:t>
+              <a:t>15</a:t>
             </a:fld>
             <a:endParaRPr lang="en-US"/>
           </a:p>
@@ -778,7 +779,7 @@
           <a:p>
             <a:fld id="{9FAC47D1-AAA4-4021-BBD5-64F096EA128A}" type="slidenum">
               <a:rPr lang="en-US" smtClean="0"/>
-              <a:t>15</a:t>
+              <a:t>16</a:t>
             </a:fld>
             <a:endParaRPr lang="en-US"/>
           </a:p>
@@ -862,7 +863,7 @@
           <a:p>
             <a:fld id="{9FAC47D1-AAA4-4021-BBD5-64F096EA128A}" type="slidenum">
               <a:rPr lang="en-US" smtClean="0"/>
-              <a:t>16</a:t>
+              <a:t>17</a:t>
             </a:fld>
             <a:endParaRPr lang="en-US"/>
           </a:p>
@@ -1788,7 +1789,7 @@
           <a:p>
             <a:fld id="{9FAC47D1-AAA4-4021-BBD5-64F096EA128A}" type="slidenum">
               <a:rPr lang="en-US" smtClean="0"/>
-              <a:t>10</a:t>
+              <a:t>11</a:t>
             </a:fld>
             <a:endParaRPr lang="en-US"/>
           </a:p>
@@ -1872,7 +1873,7 @@
           <a:p>
             <a:fld id="{9FAC47D1-AAA4-4021-BBD5-64F096EA128A}" type="slidenum">
               <a:rPr lang="en-US" smtClean="0"/>
-              <a:t>11</a:t>
+              <a:t>12</a:t>
             </a:fld>
             <a:endParaRPr lang="en-US"/>
           </a:p>
@@ -1972,7 +1973,7 @@
           <a:p>
             <a:fld id="{9FAC47D1-AAA4-4021-BBD5-64F096EA128A}" type="slidenum">
               <a:rPr lang="en-US" smtClean="0"/>
-              <a:t>13</a:t>
+              <a:t>14</a:t>
             </a:fld>
             <a:endParaRPr lang="en-US"/>
           </a:p>
@@ -2209,7 +2210,7 @@
           <a:effectLst/>
           <a:extLst>
             <a:ext uri="{C572A759-6A51-4108-AA02-DFA0A04FC94B}">
-              <ma14:wrappingTextBoxFlag xmlns="" xmlns:ma14="http://schemas.microsoft.com/office/mac/drawingml/2011/main" val="1"/>
+              <ma14:wrappingTextBoxFlag xmlns:ma14="http://schemas.microsoft.com/office/mac/drawingml/2011/main" xmlns="" val="1"/>
             </a:ext>
           </a:extLst>
         </p:spPr>
@@ -2474,7 +2475,7 @@
           <a:effectLst/>
           <a:extLst>
             <a:ext uri="{C572A759-6A51-4108-AA02-DFA0A04FC94B}">
-              <ma14:wrappingTextBoxFlag xmlns="" xmlns:ma14="http://schemas.microsoft.com/office/mac/drawingml/2011/main" val="1"/>
+              <ma14:wrappingTextBoxFlag xmlns:ma14="http://schemas.microsoft.com/office/mac/drawingml/2011/main" xmlns="" val="1"/>
             </a:ext>
           </a:extLst>
         </p:spPr>
@@ -2771,7 +2772,7 @@
           <a:effectLst/>
           <a:extLst>
             <a:ext uri="{C572A759-6A51-4108-AA02-DFA0A04FC94B}">
-              <ma14:wrappingTextBoxFlag xmlns="" xmlns:ma14="http://schemas.microsoft.com/office/mac/drawingml/2011/main" val="1"/>
+              <ma14:wrappingTextBoxFlag xmlns:ma14="http://schemas.microsoft.com/office/mac/drawingml/2011/main" xmlns="" val="1"/>
             </a:ext>
           </a:extLst>
         </p:spPr>
@@ -3086,7 +3087,7 @@
           <a:effectLst/>
           <a:extLst>
             <a:ext uri="{C572A759-6A51-4108-AA02-DFA0A04FC94B}">
-              <ma14:wrappingTextBoxFlag xmlns="" xmlns:ma14="http://schemas.microsoft.com/office/mac/drawingml/2011/main" val="1"/>
+              <ma14:wrappingTextBoxFlag xmlns:ma14="http://schemas.microsoft.com/office/mac/drawingml/2011/main" xmlns="" val="1"/>
             </a:ext>
           </a:extLst>
         </p:spPr>
@@ -3399,7 +3400,7 @@
           <a:effectLst/>
           <a:extLst>
             <a:ext uri="{C572A759-6A51-4108-AA02-DFA0A04FC94B}">
-              <ma14:wrappingTextBoxFlag xmlns="" xmlns:ma14="http://schemas.microsoft.com/office/mac/drawingml/2011/main" val="1"/>
+              <ma14:wrappingTextBoxFlag xmlns:ma14="http://schemas.microsoft.com/office/mac/drawingml/2011/main" xmlns="" val="1"/>
             </a:ext>
           </a:extLst>
         </p:spPr>
@@ -3884,7 +3885,7 @@
           <a:effectLst/>
           <a:extLst>
             <a:ext uri="{C572A759-6A51-4108-AA02-DFA0A04FC94B}">
-              <ma14:wrappingTextBoxFlag xmlns="" xmlns:ma14="http://schemas.microsoft.com/office/mac/drawingml/2011/main" val="1"/>
+              <ma14:wrappingTextBoxFlag xmlns:ma14="http://schemas.microsoft.com/office/mac/drawingml/2011/main" xmlns="" val="1"/>
             </a:ext>
           </a:extLst>
         </p:spPr>
@@ -4281,7 +4282,7 @@
           <a:effectLst/>
           <a:extLst>
             <a:ext uri="{C572A759-6A51-4108-AA02-DFA0A04FC94B}">
-              <ma14:wrappingTextBoxFlag xmlns="" xmlns:ma14="http://schemas.microsoft.com/office/mac/drawingml/2011/main" val="1"/>
+              <ma14:wrappingTextBoxFlag xmlns:ma14="http://schemas.microsoft.com/office/mac/drawingml/2011/main" xmlns="" val="1"/>
             </a:ext>
           </a:extLst>
         </p:spPr>
@@ -4820,7 +4821,7 @@
           <a:effectLst/>
           <a:extLst>
             <a:ext uri="{C572A759-6A51-4108-AA02-DFA0A04FC94B}">
-              <ma14:wrappingTextBoxFlag xmlns="" xmlns:ma14="http://schemas.microsoft.com/office/mac/drawingml/2011/main" val="1"/>
+              <ma14:wrappingTextBoxFlag xmlns:ma14="http://schemas.microsoft.com/office/mac/drawingml/2011/main" xmlns="" val="1"/>
             </a:ext>
           </a:extLst>
         </p:spPr>
@@ -5023,7 +5024,7 @@
           <a:effectLst/>
           <a:extLst>
             <a:ext uri="{C572A759-6A51-4108-AA02-DFA0A04FC94B}">
-              <ma14:wrappingTextBoxFlag xmlns="" xmlns:ma14="http://schemas.microsoft.com/office/mac/drawingml/2011/main" val="1"/>
+              <ma14:wrappingTextBoxFlag xmlns:ma14="http://schemas.microsoft.com/office/mac/drawingml/2011/main" xmlns="" val="1"/>
             </a:ext>
           </a:extLst>
         </p:spPr>
@@ -5172,7 +5173,7 @@
           <a:effectLst/>
           <a:extLst>
             <a:ext uri="{C572A759-6A51-4108-AA02-DFA0A04FC94B}">
-              <ma14:wrappingTextBoxFlag xmlns="" xmlns:ma14="http://schemas.microsoft.com/office/mac/drawingml/2011/main" val="1"/>
+              <ma14:wrappingTextBoxFlag xmlns:ma14="http://schemas.microsoft.com/office/mac/drawingml/2011/main" xmlns="" val="1"/>
             </a:ext>
           </a:extLst>
         </p:spPr>
@@ -5321,7 +5322,7 @@
           <a:effectLst/>
           <a:extLst>
             <a:ext uri="{C572A759-6A51-4108-AA02-DFA0A04FC94B}">
-              <ma14:wrappingTextBoxFlag xmlns="" xmlns:ma14="http://schemas.microsoft.com/office/mac/drawingml/2011/main" val="1"/>
+              <ma14:wrappingTextBoxFlag xmlns:ma14="http://schemas.microsoft.com/office/mac/drawingml/2011/main" xmlns="" val="1"/>
             </a:ext>
           </a:extLst>
         </p:spPr>
@@ -5615,7 +5616,7 @@
           <a:effectLst/>
           <a:extLst>
             <a:ext uri="{C572A759-6A51-4108-AA02-DFA0A04FC94B}">
-              <ma14:wrappingTextBoxFlag xmlns="" xmlns:ma14="http://schemas.microsoft.com/office/mac/drawingml/2011/main" val="1"/>
+              <ma14:wrappingTextBoxFlag xmlns:ma14="http://schemas.microsoft.com/office/mac/drawingml/2011/main" xmlns="" val="1"/>
             </a:ext>
           </a:extLst>
         </p:spPr>
@@ -6228,7 +6229,7 @@
           <a:effectLst/>
           <a:extLst>
             <a:ext uri="{C572A759-6A51-4108-AA02-DFA0A04FC94B}">
-              <ma14:wrappingTextBoxFlag xmlns="" xmlns:ma14="http://schemas.microsoft.com/office/mac/drawingml/2011/main" val="1"/>
+              <ma14:wrappingTextBoxFlag xmlns:ma14="http://schemas.microsoft.com/office/mac/drawingml/2011/main" xmlns="" val="1"/>
             </a:ext>
           </a:extLst>
         </p:spPr>
@@ -6541,7 +6542,7 @@
           <a:effectLst/>
           <a:extLst>
             <a:ext uri="{C572A759-6A51-4108-AA02-DFA0A04FC94B}">
-              <ma14:wrappingTextBoxFlag xmlns="" xmlns:ma14="http://schemas.microsoft.com/office/mac/drawingml/2011/main" val="1"/>
+              <ma14:wrappingTextBoxFlag xmlns:ma14="http://schemas.microsoft.com/office/mac/drawingml/2011/main" xmlns="" val="1"/>
             </a:ext>
           </a:extLst>
         </p:spPr>
@@ -7024,7 +7025,7 @@
           <a:effectLst/>
           <a:extLst>
             <a:ext uri="{C572A759-6A51-4108-AA02-DFA0A04FC94B}">
-              <ma14:wrappingTextBoxFlag xmlns="" xmlns:ma14="http://schemas.microsoft.com/office/mac/drawingml/2011/main" val="1"/>
+              <ma14:wrappingTextBoxFlag xmlns:ma14="http://schemas.microsoft.com/office/mac/drawingml/2011/main" xmlns="" val="1"/>
             </a:ext>
           </a:extLst>
         </p:spPr>
@@ -7334,7 +7335,7 @@
           <a:effectLst/>
           <a:extLst>
             <a:ext uri="{C572A759-6A51-4108-AA02-DFA0A04FC94B}">
-              <ma14:wrappingTextBoxFlag xmlns="" xmlns:ma14="http://schemas.microsoft.com/office/mac/drawingml/2011/main" val="1"/>
+              <ma14:wrappingTextBoxFlag xmlns:ma14="http://schemas.microsoft.com/office/mac/drawingml/2011/main" xmlns="" val="1"/>
             </a:ext>
           </a:extLst>
         </p:spPr>
@@ -7676,7 +7677,7 @@
           <a:effectLst/>
           <a:extLst>
             <a:ext uri="{C572A759-6A51-4108-AA02-DFA0A04FC94B}">
-              <ma14:wrappingTextBoxFlag xmlns="" xmlns:ma14="http://schemas.microsoft.com/office/mac/drawingml/2011/main" val="1"/>
+              <ma14:wrappingTextBoxFlag xmlns:ma14="http://schemas.microsoft.com/office/mac/drawingml/2011/main" xmlns="" val="1"/>
             </a:ext>
           </a:extLst>
         </p:spPr>
@@ -8018,7 +8019,7 @@
           <a:effectLst/>
           <a:extLst>
             <a:ext uri="{C572A759-6A51-4108-AA02-DFA0A04FC94B}">
-              <ma14:wrappingTextBoxFlag xmlns="" xmlns:ma14="http://schemas.microsoft.com/office/mac/drawingml/2011/main" val="1"/>
+              <ma14:wrappingTextBoxFlag xmlns:ma14="http://schemas.microsoft.com/office/mac/drawingml/2011/main" xmlns="" val="1"/>
             </a:ext>
           </a:extLst>
         </p:spPr>
@@ -8360,7 +8361,7 @@
           <a:effectLst/>
           <a:extLst>
             <a:ext uri="{C572A759-6A51-4108-AA02-DFA0A04FC94B}">
-              <ma14:wrappingTextBoxFlag xmlns="" xmlns:ma14="http://schemas.microsoft.com/office/mac/drawingml/2011/main" val="1"/>
+              <ma14:wrappingTextBoxFlag xmlns:ma14="http://schemas.microsoft.com/office/mac/drawingml/2011/main" xmlns="" val="1"/>
             </a:ext>
           </a:extLst>
         </p:spPr>
@@ -8702,7 +8703,7 @@
           <a:effectLst/>
           <a:extLst>
             <a:ext uri="{C572A759-6A51-4108-AA02-DFA0A04FC94B}">
-              <ma14:wrappingTextBoxFlag xmlns="" xmlns:ma14="http://schemas.microsoft.com/office/mac/drawingml/2011/main" val="1"/>
+              <ma14:wrappingTextBoxFlag xmlns:ma14="http://schemas.microsoft.com/office/mac/drawingml/2011/main" xmlns="" val="1"/>
             </a:ext>
           </a:extLst>
         </p:spPr>
@@ -9044,7 +9045,7 @@
           <a:effectLst/>
           <a:extLst>
             <a:ext uri="{C572A759-6A51-4108-AA02-DFA0A04FC94B}">
-              <ma14:wrappingTextBoxFlag xmlns="" xmlns:ma14="http://schemas.microsoft.com/office/mac/drawingml/2011/main" val="1"/>
+              <ma14:wrappingTextBoxFlag xmlns:ma14="http://schemas.microsoft.com/office/mac/drawingml/2011/main" xmlns="" val="1"/>
             </a:ext>
           </a:extLst>
         </p:spPr>
@@ -9386,7 +9387,7 @@
           <a:effectLst/>
           <a:extLst>
             <a:ext uri="{C572A759-6A51-4108-AA02-DFA0A04FC94B}">
-              <ma14:wrappingTextBoxFlag xmlns="" xmlns:ma14="http://schemas.microsoft.com/office/mac/drawingml/2011/main" val="1"/>
+              <ma14:wrappingTextBoxFlag xmlns:ma14="http://schemas.microsoft.com/office/mac/drawingml/2011/main" xmlns="" val="1"/>
             </a:ext>
           </a:extLst>
         </p:spPr>
@@ -10109,9 +10110,26 @@
           <a:p>
             <a:r>
               <a:rPr lang="en-US" b="0" dirty="0" smtClean="0"/>
-              <a:t>April 1, 2016</a:t>
-            </a:r>
+              <a:t>April 1, </a:t>
+            </a:r>
+            <a:r>
+              <a:rPr lang="en-US" b="0" dirty="0" smtClean="0"/>
+              <a:t>2016</a:t>
+            </a:r>
+          </a:p>
+          <a:p>
             <a:endParaRPr lang="en-US" b="0" dirty="0"/>
+          </a:p>
+          <a:p>
+            <a:r>
+              <a:rPr lang="en-US" sz="1600" b="0" dirty="0" err="1" smtClean="0"/>
+              <a:t>Github</a:t>
+            </a:r>
+            <a:r>
+              <a:rPr lang="en-US" sz="1600" b="0" dirty="0"/>
+              <a:t>: https://github.com/brbarnett/Neo4jBff</a:t>
+            </a:r>
+            <a:endParaRPr lang="en-US" sz="1600" b="0" dirty="0"/>
           </a:p>
         </p:txBody>
       </p:sp>
@@ -10162,19 +10180,211 @@
             <a:spLocks noGrp="1"/>
           </p:cNvSpPr>
           <p:nvPr>
-            <p:ph type="ctrTitle"/>
+            <p:ph type="title"/>
           </p:nvPr>
         </p:nvSpPr>
         <p:spPr/>
         <p:txBody>
-          <a:bodyPr>
-            <a:normAutofit/>
+          <a:bodyPr/>
+          <a:lstStyle/>
+          <a:p>
+            <a:r>
+              <a:rPr lang="en-US" dirty="0" smtClean="0"/>
+              <a:t>Other common use cases</a:t>
+            </a:r>
+            <a:endParaRPr lang="en-US" dirty="0"/>
+          </a:p>
+        </p:txBody>
+      </p:sp>
+      <p:pic>
+        <p:nvPicPr>
+          <p:cNvPr id="1026" name="Picture 2" descr="Fraud Detection"/>
+          <p:cNvPicPr>
+            <a:picLocks noChangeAspect="1" noChangeArrowheads="1"/>
+          </p:cNvPicPr>
+          <p:nvPr/>
+        </p:nvPicPr>
+        <p:blipFill>
+          <a:blip r:embed="rId2" cstate="print">
+            <a:extLst>
+              <a:ext uri="{28A0092B-C50C-407E-A947-70E740481C1C}">
+                <a14:useLocalDpi xmlns:a14="http://schemas.microsoft.com/office/drawing/2010/main" val="0"/>
+              </a:ext>
+            </a:extLst>
+          </a:blip>
+          <a:srcRect/>
+          <a:stretch>
+            <a:fillRect/>
+          </a:stretch>
+        </p:blipFill>
+        <p:spPr bwMode="auto">
+          <a:xfrm>
+            <a:off x="457200" y="1621369"/>
+            <a:ext cx="3200400" cy="1896531"/>
+          </a:xfrm>
+          <a:prstGeom prst="rect">
+            <a:avLst/>
+          </a:prstGeom>
+          <a:noFill/>
+          <a:extLst>
+            <a:ext uri="{909E8E84-426E-40DD-AFC4-6F175D3DCCD1}">
+              <a14:hiddenFill xmlns:a14="http://schemas.microsoft.com/office/drawing/2010/main">
+                <a:solidFill>
+                  <a:srgbClr val="FFFFFF"/>
+                </a:solidFill>
+              </a14:hiddenFill>
+            </a:ext>
+          </a:extLst>
+        </p:spPr>
+      </p:pic>
+      <p:pic>
+        <p:nvPicPr>
+          <p:cNvPr id="1028" name="Picture 4" descr="usecase-social-color"/>
+          <p:cNvPicPr>
+            <a:picLocks noChangeAspect="1" noChangeArrowheads="1"/>
+          </p:cNvPicPr>
+          <p:nvPr/>
+        </p:nvPicPr>
+        <p:blipFill>
+          <a:blip r:embed="rId3" cstate="print">
+            <a:extLst>
+              <a:ext uri="{28A0092B-C50C-407E-A947-70E740481C1C}">
+                <a14:useLocalDpi xmlns:a14="http://schemas.microsoft.com/office/drawing/2010/main" val="0"/>
+              </a:ext>
+            </a:extLst>
+          </a:blip>
+          <a:srcRect/>
+          <a:stretch>
+            <a:fillRect/>
+          </a:stretch>
+        </p:blipFill>
+        <p:spPr bwMode="auto">
+          <a:xfrm>
+            <a:off x="4184837" y="1565760"/>
+            <a:ext cx="3200400" cy="1896528"/>
+          </a:xfrm>
+          <a:prstGeom prst="rect">
+            <a:avLst/>
+          </a:prstGeom>
+          <a:noFill/>
+          <a:extLst>
+            <a:ext uri="{909E8E84-426E-40DD-AFC4-6F175D3DCCD1}">
+              <a14:hiddenFill xmlns:a14="http://schemas.microsoft.com/office/drawing/2010/main">
+                <a:solidFill>
+                  <a:srgbClr val="FFFFFF"/>
+                </a:solidFill>
+              </a14:hiddenFill>
+            </a:ext>
+          </a:extLst>
+        </p:spPr>
+      </p:pic>
+      <p:pic>
+        <p:nvPicPr>
+          <p:cNvPr id="1030" name="Picture 6" descr="usecase-iam-color"/>
+          <p:cNvPicPr>
+            <a:picLocks noChangeAspect="1" noChangeArrowheads="1"/>
+          </p:cNvPicPr>
+          <p:nvPr/>
+        </p:nvPicPr>
+        <p:blipFill>
+          <a:blip r:embed="rId4" cstate="print">
+            <a:extLst>
+              <a:ext uri="{28A0092B-C50C-407E-A947-70E740481C1C}">
+                <a14:useLocalDpi xmlns:a14="http://schemas.microsoft.com/office/drawing/2010/main" val="0"/>
+              </a:ext>
+            </a:extLst>
+          </a:blip>
+          <a:srcRect/>
+          <a:stretch>
+            <a:fillRect/>
+          </a:stretch>
+        </p:blipFill>
+        <p:spPr bwMode="auto">
+          <a:xfrm>
+            <a:off x="457200" y="4180933"/>
+            <a:ext cx="3200400" cy="1896528"/>
+          </a:xfrm>
+          <a:prstGeom prst="rect">
+            <a:avLst/>
+          </a:prstGeom>
+          <a:noFill/>
+          <a:extLst>
+            <a:ext uri="{909E8E84-426E-40DD-AFC4-6F175D3DCCD1}">
+              <a14:hiddenFill xmlns:a14="http://schemas.microsoft.com/office/drawing/2010/main">
+                <a:solidFill>
+                  <a:srgbClr val="FFFFFF"/>
+                </a:solidFill>
+              </a14:hiddenFill>
+            </a:ext>
+          </a:extLst>
+        </p:spPr>
+      </p:pic>
+      <p:pic>
+        <p:nvPicPr>
+          <p:cNvPr id="1032" name="Picture 8" descr="usecase-mdm"/>
+          <p:cNvPicPr>
+            <a:picLocks noChangeAspect="1" noChangeArrowheads="1"/>
+          </p:cNvPicPr>
+          <p:nvPr/>
+        </p:nvPicPr>
+        <p:blipFill>
+          <a:blip r:embed="rId5" cstate="print">
+            <a:extLst>
+              <a:ext uri="{28A0092B-C50C-407E-A947-70E740481C1C}">
+                <a14:useLocalDpi xmlns:a14="http://schemas.microsoft.com/office/drawing/2010/main" val="0"/>
+              </a:ext>
+            </a:extLst>
+          </a:blip>
+          <a:srcRect/>
+          <a:stretch>
+            <a:fillRect/>
+          </a:stretch>
+        </p:blipFill>
+        <p:spPr bwMode="auto">
+          <a:xfrm>
+            <a:off x="7912474" y="1565760"/>
+            <a:ext cx="3200400" cy="1896528"/>
+          </a:xfrm>
+          <a:prstGeom prst="rect">
+            <a:avLst/>
+          </a:prstGeom>
+          <a:noFill/>
+          <a:extLst>
+            <a:ext uri="{909E8E84-426E-40DD-AFC4-6F175D3DCCD1}">
+              <a14:hiddenFill xmlns:a14="http://schemas.microsoft.com/office/drawing/2010/main">
+                <a:solidFill>
+                  <a:srgbClr val="FFFFFF"/>
+                </a:solidFill>
+              </a14:hiddenFill>
+            </a:ext>
+          </a:extLst>
+        </p:spPr>
+      </p:pic>
+      <p:sp>
+        <p:nvSpPr>
+          <p:cNvPr id="3" name="TextBox 2"/>
+          <p:cNvSpPr txBox="1"/>
+          <p:nvPr/>
+        </p:nvSpPr>
+        <p:spPr>
+          <a:xfrm>
+            <a:off x="457200" y="1196428"/>
+            <a:ext cx="1826141" cy="369332"/>
+          </a:xfrm>
+          <a:prstGeom prst="rect">
+            <a:avLst/>
+          </a:prstGeom>
+          <a:noFill/>
+        </p:spPr>
+        <p:txBody>
+          <a:bodyPr wrap="none" rtlCol="0">
+            <a:spAutoFit/>
           </a:bodyPr>
           <a:lstStyle/>
           <a:p>
             <a:r>
               <a:rPr lang="en-US" dirty="0" smtClean="0"/>
-              <a:t>Installing Neo4j</a:t>
+              <a:t>Fraud Detection</a:t>
             </a:r>
             <a:endParaRPr lang="en-US" dirty="0"/>
           </a:p>
@@ -10182,27 +10392,239 @@
       </p:sp>
       <p:sp>
         <p:nvSpPr>
-          <p:cNvPr id="4" name="Subtitle 3"/>
-          <p:cNvSpPr>
-            <a:spLocks noGrp="1"/>
-          </p:cNvSpPr>
-          <p:nvPr>
-            <p:ph type="subTitle" idx="1"/>
-          </p:nvPr>
-        </p:nvSpPr>
-        <p:spPr>
-          <a:xfrm>
-            <a:off x="4289867" y="2741555"/>
-            <a:ext cx="7086600" cy="1655762"/>
-          </a:xfrm>
-        </p:spPr>
-        <p:txBody>
-          <a:bodyPr/>
+          <p:cNvPr id="35" name="TextBox 34"/>
+          <p:cNvSpPr txBox="1"/>
+          <p:nvPr/>
+        </p:nvSpPr>
+        <p:spPr>
+          <a:xfrm>
+            <a:off x="457199" y="3811601"/>
+            <a:ext cx="2813655" cy="369332"/>
+          </a:xfrm>
+          <a:prstGeom prst="rect">
+            <a:avLst/>
+          </a:prstGeom>
+          <a:noFill/>
+        </p:spPr>
+        <p:txBody>
+          <a:bodyPr wrap="none" rtlCol="0">
+            <a:spAutoFit/>
+          </a:bodyPr>
           <a:lstStyle/>
           <a:p>
             <a:r>
-              <a:rPr lang="en-US" b="0" dirty="0" smtClean="0"/>
-              <a:t>Prevailing leader in the Graph Database market</a:t>
+              <a:rPr lang="en-US" dirty="0" smtClean="0"/>
+              <a:t>Identity and Access </a:t>
+            </a:r>
+            <a:r>
+              <a:rPr lang="en-US" dirty="0" err="1" smtClean="0"/>
+              <a:t>Mgmt</a:t>
+            </a:r>
+            <a:endParaRPr lang="en-US" dirty="0"/>
+          </a:p>
+        </p:txBody>
+      </p:sp>
+      <p:sp>
+        <p:nvSpPr>
+          <p:cNvPr id="36" name="TextBox 35"/>
+          <p:cNvSpPr txBox="1"/>
+          <p:nvPr/>
+        </p:nvSpPr>
+        <p:spPr>
+          <a:xfrm>
+            <a:off x="4182178" y="1196428"/>
+            <a:ext cx="1723549" cy="369332"/>
+          </a:xfrm>
+          <a:prstGeom prst="rect">
+            <a:avLst/>
+          </a:prstGeom>
+          <a:noFill/>
+        </p:spPr>
+        <p:txBody>
+          <a:bodyPr wrap="none" rtlCol="0">
+            <a:spAutoFit/>
+          </a:bodyPr>
+          <a:lstStyle/>
+          <a:p>
+            <a:r>
+              <a:rPr lang="en-US" dirty="0" smtClean="0"/>
+              <a:t>Social Network</a:t>
+            </a:r>
+            <a:endParaRPr lang="en-US" dirty="0"/>
+          </a:p>
+        </p:txBody>
+      </p:sp>
+      <p:sp>
+        <p:nvSpPr>
+          <p:cNvPr id="37" name="TextBox 36"/>
+          <p:cNvSpPr txBox="1"/>
+          <p:nvPr/>
+        </p:nvSpPr>
+        <p:spPr>
+          <a:xfrm>
+            <a:off x="7920043" y="1196428"/>
+            <a:ext cx="2082621" cy="369332"/>
+          </a:xfrm>
+          <a:prstGeom prst="rect">
+            <a:avLst/>
+          </a:prstGeom>
+          <a:noFill/>
+        </p:spPr>
+        <p:txBody>
+          <a:bodyPr wrap="none" rtlCol="0">
+            <a:spAutoFit/>
+          </a:bodyPr>
+          <a:lstStyle/>
+          <a:p>
+            <a:r>
+              <a:rPr lang="en-US" dirty="0" smtClean="0"/>
+              <a:t>Master Data </a:t>
+            </a:r>
+            <a:r>
+              <a:rPr lang="en-US" dirty="0" err="1" smtClean="0"/>
+              <a:t>Mgmt</a:t>
+            </a:r>
+            <a:endParaRPr lang="en-US" dirty="0"/>
+          </a:p>
+        </p:txBody>
+      </p:sp>
+      <p:pic>
+        <p:nvPicPr>
+          <p:cNvPr id="1034" name="Picture 10" descr="usecase-network-color"/>
+          <p:cNvPicPr>
+            <a:picLocks noChangeAspect="1" noChangeArrowheads="1"/>
+          </p:cNvPicPr>
+          <p:nvPr/>
+        </p:nvPicPr>
+        <p:blipFill>
+          <a:blip r:embed="rId6" cstate="print">
+            <a:extLst>
+              <a:ext uri="{28A0092B-C50C-407E-A947-70E740481C1C}">
+                <a14:useLocalDpi xmlns:a14="http://schemas.microsoft.com/office/drawing/2010/main" val="0"/>
+              </a:ext>
+            </a:extLst>
+          </a:blip>
+          <a:srcRect/>
+          <a:stretch>
+            <a:fillRect/>
+          </a:stretch>
+        </p:blipFill>
+        <p:spPr bwMode="auto">
+          <a:xfrm>
+            <a:off x="4184837" y="4180933"/>
+            <a:ext cx="3200400" cy="1896528"/>
+          </a:xfrm>
+          <a:prstGeom prst="rect">
+            <a:avLst/>
+          </a:prstGeom>
+          <a:noFill/>
+          <a:extLst>
+            <a:ext uri="{909E8E84-426E-40DD-AFC4-6F175D3DCCD1}">
+              <a14:hiddenFill xmlns:a14="http://schemas.microsoft.com/office/drawing/2010/main">
+                <a:solidFill>
+                  <a:srgbClr val="FFFFFF"/>
+                </a:solidFill>
+              </a14:hiddenFill>
+            </a:ext>
+          </a:extLst>
+        </p:spPr>
+      </p:pic>
+      <p:sp>
+        <p:nvSpPr>
+          <p:cNvPr id="39" name="TextBox 38"/>
+          <p:cNvSpPr txBox="1"/>
+          <p:nvPr/>
+        </p:nvSpPr>
+        <p:spPr>
+          <a:xfrm>
+            <a:off x="4182177" y="3811601"/>
+            <a:ext cx="2232342" cy="369332"/>
+          </a:xfrm>
+          <a:prstGeom prst="rect">
+            <a:avLst/>
+          </a:prstGeom>
+          <a:noFill/>
+        </p:spPr>
+        <p:txBody>
+          <a:bodyPr wrap="none" rtlCol="0">
+            <a:spAutoFit/>
+          </a:bodyPr>
+          <a:lstStyle/>
+          <a:p>
+            <a:r>
+              <a:rPr lang="en-US" dirty="0" smtClean="0"/>
+              <a:t>Network and IT Ops</a:t>
+            </a:r>
+            <a:endParaRPr lang="en-US" dirty="0"/>
+          </a:p>
+        </p:txBody>
+      </p:sp>
+      <p:pic>
+        <p:nvPicPr>
+          <p:cNvPr id="1036" name="Picture 12" descr="Real-Time Recommendations"/>
+          <p:cNvPicPr>
+            <a:picLocks noChangeAspect="1" noChangeArrowheads="1"/>
+          </p:cNvPicPr>
+          <p:nvPr/>
+        </p:nvPicPr>
+        <p:blipFill>
+          <a:blip r:embed="rId7" cstate="print">
+            <a:extLst>
+              <a:ext uri="{28A0092B-C50C-407E-A947-70E740481C1C}">
+                <a14:useLocalDpi xmlns:a14="http://schemas.microsoft.com/office/drawing/2010/main" val="0"/>
+              </a:ext>
+            </a:extLst>
+          </a:blip>
+          <a:srcRect/>
+          <a:stretch>
+            <a:fillRect/>
+          </a:stretch>
+        </p:blipFill>
+        <p:spPr bwMode="auto">
+          <a:xfrm>
+            <a:off x="7912474" y="4180933"/>
+            <a:ext cx="3200400" cy="1896528"/>
+          </a:xfrm>
+          <a:prstGeom prst="rect">
+            <a:avLst/>
+          </a:prstGeom>
+          <a:noFill/>
+          <a:extLst>
+            <a:ext uri="{909E8E84-426E-40DD-AFC4-6F175D3DCCD1}">
+              <a14:hiddenFill xmlns:a14="http://schemas.microsoft.com/office/drawing/2010/main">
+                <a:solidFill>
+                  <a:srgbClr val="FFFFFF"/>
+                </a:solidFill>
+              </a14:hiddenFill>
+            </a:ext>
+          </a:extLst>
+        </p:spPr>
+      </p:pic>
+      <p:sp>
+        <p:nvSpPr>
+          <p:cNvPr id="41" name="TextBox 40"/>
+          <p:cNvSpPr txBox="1"/>
+          <p:nvPr/>
+        </p:nvSpPr>
+        <p:spPr>
+          <a:xfrm>
+            <a:off x="7920043" y="3811601"/>
+            <a:ext cx="3228191" cy="369332"/>
+          </a:xfrm>
+          <a:prstGeom prst="rect">
+            <a:avLst/>
+          </a:prstGeom>
+          <a:noFill/>
+        </p:spPr>
+        <p:txBody>
+          <a:bodyPr wrap="none" rtlCol="0">
+            <a:spAutoFit/>
+          </a:bodyPr>
+          <a:lstStyle/>
+          <a:p>
+            <a:r>
+              <a:rPr lang="en-US" dirty="0" smtClean="0"/>
+              <a:t>Real-Time Recommendations</a:t>
             </a:r>
             <a:endParaRPr lang="en-US" dirty="0"/>
           </a:p>
@@ -10211,7 +10633,7 @@
     </p:spTree>
     <p:extLst>
       <p:ext uri="{BB962C8B-B14F-4D97-AF65-F5344CB8AC3E}">
-        <p14:creationId xmlns:p14="http://schemas.microsoft.com/office/powerpoint/2010/main" val="2912637051"/>
+        <p14:creationId xmlns:p14="http://schemas.microsoft.com/office/powerpoint/2010/main" val="192495602"/>
       </p:ext>
     </p:extLst>
   </p:cSld>
@@ -10224,9 +10646,479 @@
   <p:timing>
     <p:tnLst>
       <p:par>
-        <p:cTn id="1" dur="indefinite" restart="never" nodeType="tmRoot"/>
+        <p:cTn id="1" dur="indefinite" restart="never" nodeType="tmRoot">
+          <p:childTnLst>
+            <p:seq concurrent="1" nextAc="seek">
+              <p:cTn id="2" dur="indefinite" nodeType="mainSeq">
+                <p:childTnLst>
+                  <p:par>
+                    <p:cTn id="3" fill="hold">
+                      <p:stCondLst>
+                        <p:cond delay="indefinite"/>
+                      </p:stCondLst>
+                      <p:childTnLst>
+                        <p:par>
+                          <p:cTn id="4" fill="hold">
+                            <p:stCondLst>
+                              <p:cond delay="0"/>
+                            </p:stCondLst>
+                            <p:childTnLst>
+                              <p:par>
+                                <p:cTn id="5" presetID="10" presetClass="entr" presetSubtype="0" fill="hold" grpId="0" nodeType="clickEffect">
+                                  <p:stCondLst>
+                                    <p:cond delay="0"/>
+                                  </p:stCondLst>
+                                  <p:childTnLst>
+                                    <p:set>
+                                      <p:cBhvr>
+                                        <p:cTn id="6" dur="1" fill="hold">
+                                          <p:stCondLst>
+                                            <p:cond delay="0"/>
+                                          </p:stCondLst>
+                                        </p:cTn>
+                                        <p:tgtEl>
+                                          <p:spTgt spid="36"/>
+                                        </p:tgtEl>
+                                        <p:attrNameLst>
+                                          <p:attrName>style.visibility</p:attrName>
+                                        </p:attrNameLst>
+                                      </p:cBhvr>
+                                      <p:to>
+                                        <p:strVal val="visible"/>
+                                      </p:to>
+                                    </p:set>
+                                    <p:animEffect transition="in" filter="fade">
+                                      <p:cBhvr>
+                                        <p:cTn id="7" dur="500"/>
+                                        <p:tgtEl>
+                                          <p:spTgt spid="36"/>
+                                        </p:tgtEl>
+                                      </p:cBhvr>
+                                    </p:animEffect>
+                                  </p:childTnLst>
+                                </p:cTn>
+                              </p:par>
+                              <p:par>
+                                <p:cTn id="8" presetID="10" presetClass="entr" presetSubtype="0" fill="hold" nodeType="withEffect">
+                                  <p:stCondLst>
+                                    <p:cond delay="0"/>
+                                  </p:stCondLst>
+                                  <p:childTnLst>
+                                    <p:set>
+                                      <p:cBhvr>
+                                        <p:cTn id="9" dur="1" fill="hold">
+                                          <p:stCondLst>
+                                            <p:cond delay="0"/>
+                                          </p:stCondLst>
+                                        </p:cTn>
+                                        <p:tgtEl>
+                                          <p:spTgt spid="1028"/>
+                                        </p:tgtEl>
+                                        <p:attrNameLst>
+                                          <p:attrName>style.visibility</p:attrName>
+                                        </p:attrNameLst>
+                                      </p:cBhvr>
+                                      <p:to>
+                                        <p:strVal val="visible"/>
+                                      </p:to>
+                                    </p:set>
+                                    <p:animEffect transition="in" filter="fade">
+                                      <p:cBhvr>
+                                        <p:cTn id="10" dur="500"/>
+                                        <p:tgtEl>
+                                          <p:spTgt spid="1028"/>
+                                        </p:tgtEl>
+                                      </p:cBhvr>
+                                    </p:animEffect>
+                                  </p:childTnLst>
+                                </p:cTn>
+                              </p:par>
+                            </p:childTnLst>
+                          </p:cTn>
+                        </p:par>
+                      </p:childTnLst>
+                    </p:cTn>
+                  </p:par>
+                  <p:par>
+                    <p:cTn id="11" fill="hold">
+                      <p:stCondLst>
+                        <p:cond delay="indefinite"/>
+                      </p:stCondLst>
+                      <p:childTnLst>
+                        <p:par>
+                          <p:cTn id="12" fill="hold">
+                            <p:stCondLst>
+                              <p:cond delay="0"/>
+                            </p:stCondLst>
+                            <p:childTnLst>
+                              <p:par>
+                                <p:cTn id="13" presetID="10" presetClass="entr" presetSubtype="0" fill="hold" grpId="0" nodeType="clickEffect">
+                                  <p:stCondLst>
+                                    <p:cond delay="0"/>
+                                  </p:stCondLst>
+                                  <p:childTnLst>
+                                    <p:set>
+                                      <p:cBhvr>
+                                        <p:cTn id="14" dur="1" fill="hold">
+                                          <p:stCondLst>
+                                            <p:cond delay="0"/>
+                                          </p:stCondLst>
+                                        </p:cTn>
+                                        <p:tgtEl>
+                                          <p:spTgt spid="37"/>
+                                        </p:tgtEl>
+                                        <p:attrNameLst>
+                                          <p:attrName>style.visibility</p:attrName>
+                                        </p:attrNameLst>
+                                      </p:cBhvr>
+                                      <p:to>
+                                        <p:strVal val="visible"/>
+                                      </p:to>
+                                    </p:set>
+                                    <p:animEffect transition="in" filter="fade">
+                                      <p:cBhvr>
+                                        <p:cTn id="15" dur="500"/>
+                                        <p:tgtEl>
+                                          <p:spTgt spid="37"/>
+                                        </p:tgtEl>
+                                      </p:cBhvr>
+                                    </p:animEffect>
+                                  </p:childTnLst>
+                                </p:cTn>
+                              </p:par>
+                              <p:par>
+                                <p:cTn id="16" presetID="10" presetClass="entr" presetSubtype="0" fill="hold" nodeType="withEffect">
+                                  <p:stCondLst>
+                                    <p:cond delay="0"/>
+                                  </p:stCondLst>
+                                  <p:childTnLst>
+                                    <p:set>
+                                      <p:cBhvr>
+                                        <p:cTn id="17" dur="1" fill="hold">
+                                          <p:stCondLst>
+                                            <p:cond delay="0"/>
+                                          </p:stCondLst>
+                                        </p:cTn>
+                                        <p:tgtEl>
+                                          <p:spTgt spid="1032"/>
+                                        </p:tgtEl>
+                                        <p:attrNameLst>
+                                          <p:attrName>style.visibility</p:attrName>
+                                        </p:attrNameLst>
+                                      </p:cBhvr>
+                                      <p:to>
+                                        <p:strVal val="visible"/>
+                                      </p:to>
+                                    </p:set>
+                                    <p:animEffect transition="in" filter="fade">
+                                      <p:cBhvr>
+                                        <p:cTn id="18" dur="500"/>
+                                        <p:tgtEl>
+                                          <p:spTgt spid="1032"/>
+                                        </p:tgtEl>
+                                      </p:cBhvr>
+                                    </p:animEffect>
+                                  </p:childTnLst>
+                                </p:cTn>
+                              </p:par>
+                            </p:childTnLst>
+                          </p:cTn>
+                        </p:par>
+                      </p:childTnLst>
+                    </p:cTn>
+                  </p:par>
+                  <p:par>
+                    <p:cTn id="19" fill="hold">
+                      <p:stCondLst>
+                        <p:cond delay="indefinite"/>
+                      </p:stCondLst>
+                      <p:childTnLst>
+                        <p:par>
+                          <p:cTn id="20" fill="hold">
+                            <p:stCondLst>
+                              <p:cond delay="0"/>
+                            </p:stCondLst>
+                            <p:childTnLst>
+                              <p:par>
+                                <p:cTn id="21" presetID="10" presetClass="entr" presetSubtype="0" fill="hold" grpId="0" nodeType="clickEffect">
+                                  <p:stCondLst>
+                                    <p:cond delay="0"/>
+                                  </p:stCondLst>
+                                  <p:childTnLst>
+                                    <p:set>
+                                      <p:cBhvr>
+                                        <p:cTn id="22" dur="1" fill="hold">
+                                          <p:stCondLst>
+                                            <p:cond delay="0"/>
+                                          </p:stCondLst>
+                                        </p:cTn>
+                                        <p:tgtEl>
+                                          <p:spTgt spid="35"/>
+                                        </p:tgtEl>
+                                        <p:attrNameLst>
+                                          <p:attrName>style.visibility</p:attrName>
+                                        </p:attrNameLst>
+                                      </p:cBhvr>
+                                      <p:to>
+                                        <p:strVal val="visible"/>
+                                      </p:to>
+                                    </p:set>
+                                    <p:animEffect transition="in" filter="fade">
+                                      <p:cBhvr>
+                                        <p:cTn id="23" dur="500"/>
+                                        <p:tgtEl>
+                                          <p:spTgt spid="35"/>
+                                        </p:tgtEl>
+                                      </p:cBhvr>
+                                    </p:animEffect>
+                                  </p:childTnLst>
+                                </p:cTn>
+                              </p:par>
+                              <p:par>
+                                <p:cTn id="24" presetID="10" presetClass="entr" presetSubtype="0" fill="hold" nodeType="withEffect">
+                                  <p:stCondLst>
+                                    <p:cond delay="0"/>
+                                  </p:stCondLst>
+                                  <p:childTnLst>
+                                    <p:set>
+                                      <p:cBhvr>
+                                        <p:cTn id="25" dur="1" fill="hold">
+                                          <p:stCondLst>
+                                            <p:cond delay="0"/>
+                                          </p:stCondLst>
+                                        </p:cTn>
+                                        <p:tgtEl>
+                                          <p:spTgt spid="1030"/>
+                                        </p:tgtEl>
+                                        <p:attrNameLst>
+                                          <p:attrName>style.visibility</p:attrName>
+                                        </p:attrNameLst>
+                                      </p:cBhvr>
+                                      <p:to>
+                                        <p:strVal val="visible"/>
+                                      </p:to>
+                                    </p:set>
+                                    <p:animEffect transition="in" filter="fade">
+                                      <p:cBhvr>
+                                        <p:cTn id="26" dur="500"/>
+                                        <p:tgtEl>
+                                          <p:spTgt spid="1030"/>
+                                        </p:tgtEl>
+                                      </p:cBhvr>
+                                    </p:animEffect>
+                                  </p:childTnLst>
+                                </p:cTn>
+                              </p:par>
+                            </p:childTnLst>
+                          </p:cTn>
+                        </p:par>
+                      </p:childTnLst>
+                    </p:cTn>
+                  </p:par>
+                  <p:par>
+                    <p:cTn id="27" fill="hold">
+                      <p:stCondLst>
+                        <p:cond delay="indefinite"/>
+                      </p:stCondLst>
+                      <p:childTnLst>
+                        <p:par>
+                          <p:cTn id="28" fill="hold">
+                            <p:stCondLst>
+                              <p:cond delay="0"/>
+                            </p:stCondLst>
+                            <p:childTnLst>
+                              <p:par>
+                                <p:cTn id="29" presetID="10" presetClass="entr" presetSubtype="0" fill="hold" nodeType="clickEffect">
+                                  <p:stCondLst>
+                                    <p:cond delay="0"/>
+                                  </p:stCondLst>
+                                  <p:childTnLst>
+                                    <p:set>
+                                      <p:cBhvr>
+                                        <p:cTn id="30" dur="1" fill="hold">
+                                          <p:stCondLst>
+                                            <p:cond delay="0"/>
+                                          </p:stCondLst>
+                                        </p:cTn>
+                                        <p:tgtEl>
+                                          <p:spTgt spid="1034"/>
+                                        </p:tgtEl>
+                                        <p:attrNameLst>
+                                          <p:attrName>style.visibility</p:attrName>
+                                        </p:attrNameLst>
+                                      </p:cBhvr>
+                                      <p:to>
+                                        <p:strVal val="visible"/>
+                                      </p:to>
+                                    </p:set>
+                                    <p:animEffect transition="in" filter="fade">
+                                      <p:cBhvr>
+                                        <p:cTn id="31" dur="500"/>
+                                        <p:tgtEl>
+                                          <p:spTgt spid="1034"/>
+                                        </p:tgtEl>
+                                      </p:cBhvr>
+                                    </p:animEffect>
+                                  </p:childTnLst>
+                                </p:cTn>
+                              </p:par>
+                              <p:par>
+                                <p:cTn id="32" presetID="10" presetClass="entr" presetSubtype="0" fill="hold" grpId="0" nodeType="withEffect">
+                                  <p:stCondLst>
+                                    <p:cond delay="0"/>
+                                  </p:stCondLst>
+                                  <p:childTnLst>
+                                    <p:set>
+                                      <p:cBhvr>
+                                        <p:cTn id="33" dur="1" fill="hold">
+                                          <p:stCondLst>
+                                            <p:cond delay="0"/>
+                                          </p:stCondLst>
+                                        </p:cTn>
+                                        <p:tgtEl>
+                                          <p:spTgt spid="39"/>
+                                        </p:tgtEl>
+                                        <p:attrNameLst>
+                                          <p:attrName>style.visibility</p:attrName>
+                                        </p:attrNameLst>
+                                      </p:cBhvr>
+                                      <p:to>
+                                        <p:strVal val="visible"/>
+                                      </p:to>
+                                    </p:set>
+                                    <p:animEffect transition="in" filter="fade">
+                                      <p:cBhvr>
+                                        <p:cTn id="34" dur="500"/>
+                                        <p:tgtEl>
+                                          <p:spTgt spid="39"/>
+                                        </p:tgtEl>
+                                      </p:cBhvr>
+                                    </p:animEffect>
+                                  </p:childTnLst>
+                                </p:cTn>
+                              </p:par>
+                            </p:childTnLst>
+                          </p:cTn>
+                        </p:par>
+                      </p:childTnLst>
+                    </p:cTn>
+                  </p:par>
+                  <p:par>
+                    <p:cTn id="35" fill="hold">
+                      <p:stCondLst>
+                        <p:cond delay="indefinite"/>
+                      </p:stCondLst>
+                      <p:childTnLst>
+                        <p:par>
+                          <p:cTn id="36" fill="hold">
+                            <p:stCondLst>
+                              <p:cond delay="0"/>
+                            </p:stCondLst>
+                            <p:childTnLst>
+                              <p:par>
+                                <p:cTn id="37" presetID="10" presetClass="entr" presetSubtype="0" fill="hold" nodeType="clickEffect">
+                                  <p:stCondLst>
+                                    <p:cond delay="0"/>
+                                  </p:stCondLst>
+                                  <p:childTnLst>
+                                    <p:set>
+                                      <p:cBhvr>
+                                        <p:cTn id="38" dur="1" fill="hold">
+                                          <p:stCondLst>
+                                            <p:cond delay="0"/>
+                                          </p:stCondLst>
+                                        </p:cTn>
+                                        <p:tgtEl>
+                                          <p:spTgt spid="1036"/>
+                                        </p:tgtEl>
+                                        <p:attrNameLst>
+                                          <p:attrName>style.visibility</p:attrName>
+                                        </p:attrNameLst>
+                                      </p:cBhvr>
+                                      <p:to>
+                                        <p:strVal val="visible"/>
+                                      </p:to>
+                                    </p:set>
+                                    <p:animEffect transition="in" filter="fade">
+                                      <p:cBhvr>
+                                        <p:cTn id="39" dur="500"/>
+                                        <p:tgtEl>
+                                          <p:spTgt spid="1036"/>
+                                        </p:tgtEl>
+                                      </p:cBhvr>
+                                    </p:animEffect>
+                                  </p:childTnLst>
+                                </p:cTn>
+                              </p:par>
+                              <p:par>
+                                <p:cTn id="40" presetID="10" presetClass="entr" presetSubtype="0" fill="hold" grpId="0" nodeType="withEffect">
+                                  <p:stCondLst>
+                                    <p:cond delay="0"/>
+                                  </p:stCondLst>
+                                  <p:childTnLst>
+                                    <p:set>
+                                      <p:cBhvr>
+                                        <p:cTn id="41" dur="1" fill="hold">
+                                          <p:stCondLst>
+                                            <p:cond delay="0"/>
+                                          </p:stCondLst>
+                                        </p:cTn>
+                                        <p:tgtEl>
+                                          <p:spTgt spid="41"/>
+                                        </p:tgtEl>
+                                        <p:attrNameLst>
+                                          <p:attrName>style.visibility</p:attrName>
+                                        </p:attrNameLst>
+                                      </p:cBhvr>
+                                      <p:to>
+                                        <p:strVal val="visible"/>
+                                      </p:to>
+                                    </p:set>
+                                    <p:animEffect transition="in" filter="fade">
+                                      <p:cBhvr>
+                                        <p:cTn id="42" dur="500"/>
+                                        <p:tgtEl>
+                                          <p:spTgt spid="41"/>
+                                        </p:tgtEl>
+                                      </p:cBhvr>
+                                    </p:animEffect>
+                                  </p:childTnLst>
+                                </p:cTn>
+                              </p:par>
+                            </p:childTnLst>
+                          </p:cTn>
+                        </p:par>
+                      </p:childTnLst>
+                    </p:cTn>
+                  </p:par>
+                </p:childTnLst>
+              </p:cTn>
+              <p:prevCondLst>
+                <p:cond evt="onPrev" delay="0">
+                  <p:tgtEl>
+                    <p:sldTgt/>
+                  </p:tgtEl>
+                </p:cond>
+              </p:prevCondLst>
+              <p:nextCondLst>
+                <p:cond evt="onNext" delay="0">
+                  <p:tgtEl>
+                    <p:sldTgt/>
+                  </p:tgtEl>
+                </p:cond>
+              </p:nextCondLst>
+            </p:seq>
+          </p:childTnLst>
+        </p:cTn>
       </p:par>
     </p:tnLst>
+    <p:bldLst>
+      <p:bldP spid="35" grpId="0"/>
+      <p:bldP spid="36" grpId="0"/>
+      <p:bldP spid="37" grpId="0"/>
+      <p:bldP spid="39" grpId="0"/>
+      <p:bldP spid="41" grpId="0"/>
+    </p:bldLst>
   </p:timing>
 </p:sld>
 </file>
@@ -10250,171 +11142,61 @@
       </p:grpSpPr>
       <p:sp>
         <p:nvSpPr>
-          <p:cNvPr id="3" name="Title 2"/>
+          <p:cNvPr id="2" name="Title 1"/>
           <p:cNvSpPr>
             <a:spLocks noGrp="1"/>
           </p:cNvSpPr>
           <p:nvPr>
-            <p:ph type="title"/>
+            <p:ph type="ctrTitle"/>
           </p:nvPr>
         </p:nvSpPr>
-        <p:spPr>
-          <a:xfrm>
-            <a:off x="2495550" y="3267075"/>
-            <a:ext cx="7086600" cy="914400"/>
+        <p:spPr/>
+        <p:txBody>
+          <a:bodyPr>
+            <a:normAutofit/>
+          </a:bodyPr>
+          <a:lstStyle/>
+          <a:p>
+            <a:r>
+              <a:rPr lang="en-US" dirty="0" smtClean="0"/>
+              <a:t>Installing Neo4j</a:t>
+            </a:r>
+            <a:endParaRPr lang="en-US" dirty="0"/>
+          </a:p>
+        </p:txBody>
+      </p:sp>
+      <p:sp>
+        <p:nvSpPr>
+          <p:cNvPr id="4" name="Subtitle 3"/>
+          <p:cNvSpPr>
+            <a:spLocks noGrp="1"/>
+          </p:cNvSpPr>
+          <p:nvPr>
+            <p:ph type="subTitle" idx="1"/>
+          </p:nvPr>
+        </p:nvSpPr>
+        <p:spPr>
+          <a:xfrm>
+            <a:off x="4289867" y="2741555"/>
+            <a:ext cx="7086600" cy="1655762"/>
           </a:xfrm>
         </p:spPr>
         <p:txBody>
           <a:bodyPr/>
           <a:lstStyle/>
           <a:p>
-            <a:pPr algn="ctr"/>
-            <a:r>
-              <a:rPr lang="en-US" dirty="0">
-                <a:hlinkClick r:id="rId3"/>
-              </a:rPr>
-              <a:t>http://neo4j.com/download/</a:t>
+            <a:r>
+              <a:rPr lang="en-US" b="0" dirty="0" smtClean="0"/>
+              <a:t>Prevailing leader in the Graph Database market</a:t>
             </a:r>
             <a:endParaRPr lang="en-US" dirty="0"/>
           </a:p>
         </p:txBody>
       </p:sp>
-      <p:sp>
-        <p:nvSpPr>
-          <p:cNvPr id="4" name="Striped Right Arrow 3"/>
-          <p:cNvSpPr/>
-          <p:nvPr/>
-        </p:nvSpPr>
-        <p:spPr>
-          <a:xfrm>
-            <a:off x="4357688" y="4448175"/>
-            <a:ext cx="600075" cy="390525"/>
-          </a:xfrm>
-          <a:prstGeom prst="stripedRightArrow">
-            <a:avLst/>
-          </a:prstGeom>
-        </p:spPr>
-        <p:style>
-          <a:lnRef idx="2">
-            <a:schemeClr val="accent1">
-              <a:shade val="50000"/>
-            </a:schemeClr>
-          </a:lnRef>
-          <a:fillRef idx="1">
-            <a:schemeClr val="accent1"/>
-          </a:fillRef>
-          <a:effectRef idx="0">
-            <a:schemeClr val="accent1"/>
-          </a:effectRef>
-          <a:fontRef idx="minor">
-            <a:schemeClr val="lt1"/>
-          </a:fontRef>
-        </p:style>
-        <p:txBody>
-          <a:bodyPr rtlCol="0" anchor="ctr"/>
-          <a:lstStyle/>
-          <a:p>
-            <a:pPr algn="ctr"/>
-            <a:endParaRPr lang="en-US"/>
-          </a:p>
-        </p:txBody>
-      </p:sp>
-      <p:sp>
-        <p:nvSpPr>
-          <p:cNvPr id="22" name="Title 2"/>
-          <p:cNvSpPr txBox="1">
-            <a:spLocks/>
-          </p:cNvSpPr>
-          <p:nvPr/>
-        </p:nvSpPr>
-        <p:spPr>
-          <a:xfrm>
-            <a:off x="4657725" y="4186237"/>
-            <a:ext cx="4200525" cy="914400"/>
-          </a:xfrm>
-          <a:prstGeom prst="rect">
-            <a:avLst/>
-          </a:prstGeom>
-        </p:spPr>
-        <p:txBody>
-          <a:bodyPr vert="horz" lIns="91440" tIns="45720" rIns="91440" bIns="45720" rtlCol="0" anchor="ctr">
-            <a:noAutofit/>
-          </a:bodyPr>
-          <a:lstStyle>
-            <a:lvl1pPr algn="l" defTabSz="412740" rtl="0" eaLnBrk="1" latinLnBrk="0" hangingPunct="1">
-              <a:lnSpc>
-                <a:spcPct val="100000"/>
-              </a:lnSpc>
-              <a:spcBef>
-                <a:spcPct val="0"/>
-              </a:spcBef>
-              <a:buNone/>
-              <a:defRPr lang="en-US" sz="3600" b="1" i="0" kern="1200" spc="-72" dirty="0">
-                <a:solidFill>
-                  <a:schemeClr val="tx1"/>
-                </a:solidFill>
-                <a:latin typeface="Helvetica"/>
-                <a:ea typeface="+mj-ea"/>
-                <a:cs typeface="Helvetica"/>
-                <a:sym typeface="Helvetica"/>
-              </a:defRPr>
-            </a:lvl1pPr>
-          </a:lstStyle>
-          <a:p>
-            <a:pPr algn="ctr"/>
-            <a:r>
-              <a:rPr lang="en-US" sz="1400" dirty="0" smtClean="0"/>
-              <a:t>Download Community Edition (Free)</a:t>
-            </a:r>
-            <a:endParaRPr lang="en-US" sz="1400" dirty="0"/>
-          </a:p>
-        </p:txBody>
-      </p:sp>
-      <p:pic>
-        <p:nvPicPr>
-          <p:cNvPr id="1026" name="Picture 2" descr="Neo4j Home"/>
-          <p:cNvPicPr>
-            <a:picLocks noChangeAspect="1" noChangeArrowheads="1"/>
-          </p:cNvPicPr>
-          <p:nvPr/>
-        </p:nvPicPr>
-        <p:blipFill>
-          <a:blip r:embed="rId4">
-            <a:extLst>
-              <a:ext uri="{28A0092B-C50C-407E-A947-70E740481C1C}">
-                <a14:useLocalDpi xmlns:a14="http://schemas.microsoft.com/office/drawing/2010/main" val="0"/>
-              </a:ext>
-            </a:extLst>
-          </a:blip>
-          <a:srcRect/>
-          <a:stretch>
-            <a:fillRect/>
-          </a:stretch>
-        </p:blipFill>
-        <p:spPr bwMode="auto">
-          <a:xfrm>
-            <a:off x="4967287" y="2047875"/>
-            <a:ext cx="2143125" cy="952500"/>
-          </a:xfrm>
-          <a:prstGeom prst="rect">
-            <a:avLst/>
-          </a:prstGeom>
-          <a:noFill/>
-          <a:extLst>
-            <a:ext uri="{909E8E84-426E-40DD-AFC4-6F175D3DCCD1}">
-              <a14:hiddenFill xmlns:a14="http://schemas.microsoft.com/office/drawing/2010/main">
-                <a:solidFill>
-                  <a:srgbClr val="FFFFFF"/>
-                </a:solidFill>
-              </a14:hiddenFill>
-            </a:ext>
-          </a:extLst>
-        </p:spPr>
-      </p:pic>
     </p:spTree>
     <p:extLst>
       <p:ext uri="{BB962C8B-B14F-4D97-AF65-F5344CB8AC3E}">
-        <p14:creationId xmlns:p14="http://schemas.microsoft.com/office/powerpoint/2010/main" val="271100197"/>
+        <p14:creationId xmlns:p14="http://schemas.microsoft.com/office/powerpoint/2010/main" val="2912637051"/>
       </p:ext>
     </p:extLst>
   </p:cSld>
@@ -10453,83 +11235,171 @@
       </p:grpSpPr>
       <p:sp>
         <p:nvSpPr>
-          <p:cNvPr id="2" name="Title 1"/>
+          <p:cNvPr id="3" name="Title 2"/>
           <p:cNvSpPr>
             <a:spLocks noGrp="1"/>
           </p:cNvSpPr>
           <p:nvPr>
-            <p:ph type="ctrTitle"/>
+            <p:ph type="title"/>
           </p:nvPr>
         </p:nvSpPr>
-        <p:spPr/>
-        <p:txBody>
-          <a:bodyPr>
-            <a:normAutofit/>
+        <p:spPr>
+          <a:xfrm>
+            <a:off x="2495550" y="3267075"/>
+            <a:ext cx="7086600" cy="914400"/>
+          </a:xfrm>
+        </p:spPr>
+        <p:txBody>
+          <a:bodyPr/>
+          <a:lstStyle/>
+          <a:p>
+            <a:pPr algn="ctr"/>
+            <a:r>
+              <a:rPr lang="en-US" dirty="0">
+                <a:hlinkClick r:id="rId3"/>
+              </a:rPr>
+              <a:t>http://neo4j.com/download/</a:t>
+            </a:r>
+            <a:endParaRPr lang="en-US" dirty="0"/>
+          </a:p>
+        </p:txBody>
+      </p:sp>
+      <p:sp>
+        <p:nvSpPr>
+          <p:cNvPr id="4" name="Striped Right Arrow 3"/>
+          <p:cNvSpPr/>
+          <p:nvPr/>
+        </p:nvSpPr>
+        <p:spPr>
+          <a:xfrm>
+            <a:off x="4357688" y="4448175"/>
+            <a:ext cx="600075" cy="390525"/>
+          </a:xfrm>
+          <a:prstGeom prst="stripedRightArrow">
+            <a:avLst/>
+          </a:prstGeom>
+        </p:spPr>
+        <p:style>
+          <a:lnRef idx="2">
+            <a:schemeClr val="accent1">
+              <a:shade val="50000"/>
+            </a:schemeClr>
+          </a:lnRef>
+          <a:fillRef idx="1">
+            <a:schemeClr val="accent1"/>
+          </a:fillRef>
+          <a:effectRef idx="0">
+            <a:schemeClr val="accent1"/>
+          </a:effectRef>
+          <a:fontRef idx="minor">
+            <a:schemeClr val="lt1"/>
+          </a:fontRef>
+        </p:style>
+        <p:txBody>
+          <a:bodyPr rtlCol="0" anchor="ctr"/>
+          <a:lstStyle/>
+          <a:p>
+            <a:pPr algn="ctr"/>
+            <a:endParaRPr lang="en-US"/>
+          </a:p>
+        </p:txBody>
+      </p:sp>
+      <p:sp>
+        <p:nvSpPr>
+          <p:cNvPr id="22" name="Title 2"/>
+          <p:cNvSpPr txBox="1">
+            <a:spLocks/>
+          </p:cNvSpPr>
+          <p:nvPr/>
+        </p:nvSpPr>
+        <p:spPr>
+          <a:xfrm>
+            <a:off x="4657725" y="4186237"/>
+            <a:ext cx="4200525" cy="914400"/>
+          </a:xfrm>
+          <a:prstGeom prst="rect">
+            <a:avLst/>
+          </a:prstGeom>
+        </p:spPr>
+        <p:txBody>
+          <a:bodyPr vert="horz" lIns="91440" tIns="45720" rIns="91440" bIns="45720" rtlCol="0" anchor="ctr">
+            <a:noAutofit/>
           </a:bodyPr>
-          <a:lstStyle/>
-          <a:p>
-            <a:r>
-              <a:rPr lang="en-US" dirty="0" smtClean="0"/>
-              <a:t>Cypher</a:t>
-            </a:r>
-            <a:endParaRPr lang="en-US" dirty="0"/>
-          </a:p>
-        </p:txBody>
-      </p:sp>
-      <p:sp>
-        <p:nvSpPr>
-          <p:cNvPr id="3" name="Subtitle 3"/>
-          <p:cNvSpPr>
-            <a:spLocks noGrp="1"/>
-          </p:cNvSpPr>
-          <p:nvPr>
-            <p:ph type="subTitle" idx="1"/>
-          </p:nvPr>
-        </p:nvSpPr>
-        <p:spPr>
-          <a:xfrm>
-            <a:off x="4289867" y="2741555"/>
-            <a:ext cx="7086600" cy="1655762"/>
-          </a:xfrm>
-        </p:spPr>
-        <p:txBody>
-          <a:bodyPr>
-            <a:normAutofit/>
-          </a:bodyPr>
-          <a:lstStyle/>
-          <a:p>
-            <a:r>
-              <a:rPr lang="en-US" sz="900" b="0" dirty="0" smtClean="0"/>
-              <a:t>(</a:t>
-            </a:r>
-            <a:r>
-              <a:rPr lang="en-US" sz="900" b="0" dirty="0" err="1" smtClean="0"/>
-              <a:t>p:Person</a:t>
-            </a:r>
-            <a:r>
-              <a:rPr lang="en-US" sz="900" b="0" dirty="0"/>
-              <a:t> </a:t>
-            </a:r>
-            <a:r>
-              <a:rPr lang="en-US" sz="900" b="0" dirty="0" smtClean="0"/>
-              <a:t>{ name: ‘Brandon’ })-[:Likes]-&gt;(</a:t>
-            </a:r>
-            <a:r>
-              <a:rPr lang="en-US" sz="900" b="0" dirty="0" err="1" smtClean="0"/>
-              <a:t>l:Language</a:t>
-            </a:r>
-            <a:r>
-              <a:rPr lang="en-US" sz="900" b="0" dirty="0" smtClean="0"/>
-              <a:t> { name: ‘Cypher’ })</a:t>
-            </a:r>
-            <a:endParaRPr lang="en-US" sz="900" dirty="0"/>
-          </a:p>
-        </p:txBody>
-      </p:sp>
+          <a:lstStyle>
+            <a:lvl1pPr algn="l" defTabSz="412740" rtl="0" eaLnBrk="1" latinLnBrk="0" hangingPunct="1">
+              <a:lnSpc>
+                <a:spcPct val="100000"/>
+              </a:lnSpc>
+              <a:spcBef>
+                <a:spcPct val="0"/>
+              </a:spcBef>
+              <a:buNone/>
+              <a:defRPr lang="en-US" sz="3600" b="1" i="0" kern="1200" spc="-72" dirty="0">
+                <a:solidFill>
+                  <a:schemeClr val="tx1"/>
+                </a:solidFill>
+                <a:latin typeface="Helvetica"/>
+                <a:ea typeface="+mj-ea"/>
+                <a:cs typeface="Helvetica"/>
+                <a:sym typeface="Helvetica"/>
+              </a:defRPr>
+            </a:lvl1pPr>
+          </a:lstStyle>
+          <a:p>
+            <a:pPr algn="ctr"/>
+            <a:r>
+              <a:rPr lang="en-US" sz="1400" dirty="0" smtClean="0"/>
+              <a:t>Download Community Edition (Free)</a:t>
+            </a:r>
+            <a:endParaRPr lang="en-US" sz="1400" dirty="0"/>
+          </a:p>
+        </p:txBody>
+      </p:sp>
+      <p:pic>
+        <p:nvPicPr>
+          <p:cNvPr id="1026" name="Picture 2" descr="Neo4j Home"/>
+          <p:cNvPicPr>
+            <a:picLocks noChangeAspect="1" noChangeArrowheads="1"/>
+          </p:cNvPicPr>
+          <p:nvPr/>
+        </p:nvPicPr>
+        <p:blipFill>
+          <a:blip r:embed="rId4">
+            <a:extLst>
+              <a:ext uri="{28A0092B-C50C-407E-A947-70E740481C1C}">
+                <a14:useLocalDpi xmlns:a14="http://schemas.microsoft.com/office/drawing/2010/main" val="0"/>
+              </a:ext>
+            </a:extLst>
+          </a:blip>
+          <a:srcRect/>
+          <a:stretch>
+            <a:fillRect/>
+          </a:stretch>
+        </p:blipFill>
+        <p:spPr bwMode="auto">
+          <a:xfrm>
+            <a:off x="4967287" y="2047875"/>
+            <a:ext cx="2143125" cy="952500"/>
+          </a:xfrm>
+          <a:prstGeom prst="rect">
+            <a:avLst/>
+          </a:prstGeom>
+          <a:noFill/>
+          <a:extLst>
+            <a:ext uri="{909E8E84-426E-40DD-AFC4-6F175D3DCCD1}">
+              <a14:hiddenFill xmlns:a14="http://schemas.microsoft.com/office/drawing/2010/main">
+                <a:solidFill>
+                  <a:srgbClr val="FFFFFF"/>
+                </a:solidFill>
+              </a14:hiddenFill>
+            </a:ext>
+          </a:extLst>
+        </p:spPr>
+      </p:pic>
     </p:spTree>
     <p:extLst>
       <p:ext uri="{BB962C8B-B14F-4D97-AF65-F5344CB8AC3E}">
-        <p14:creationId xmlns:p14="http://schemas.microsoft.com/office/powerpoint/2010/main" val="3110814148"/>
+        <p14:creationId xmlns:p14="http://schemas.microsoft.com/office/powerpoint/2010/main" val="271100197"/>
       </p:ext>
     </p:extLst>
   </p:cSld>
@@ -10573,17 +11443,19 @@
             <a:spLocks noGrp="1"/>
           </p:cNvSpPr>
           <p:nvPr>
-            <p:ph type="title"/>
+            <p:ph type="ctrTitle"/>
           </p:nvPr>
         </p:nvSpPr>
         <p:spPr/>
         <p:txBody>
-          <a:bodyPr/>
+          <a:bodyPr>
+            <a:normAutofit/>
+          </a:bodyPr>
           <a:lstStyle/>
           <a:p>
             <a:r>
               <a:rPr lang="en-US" dirty="0" smtClean="0"/>
-              <a:t>The Basics of Cypher</a:t>
+              <a:t>Cypher</a:t>
             </a:r>
             <a:endParaRPr lang="en-US" dirty="0"/>
           </a:p>
@@ -10591,18 +11463,18 @@
       </p:sp>
       <p:sp>
         <p:nvSpPr>
-          <p:cNvPr id="3" name="Content Placeholder 2"/>
+          <p:cNvPr id="3" name="Subtitle 3"/>
           <p:cNvSpPr>
             <a:spLocks noGrp="1"/>
           </p:cNvSpPr>
           <p:nvPr>
-            <p:ph idx="1"/>
+            <p:ph type="subTitle" idx="1"/>
           </p:nvPr>
         </p:nvSpPr>
         <p:spPr>
           <a:xfrm>
-            <a:off x="457201" y="1261872"/>
-            <a:ext cx="6668530" cy="3947691"/>
+            <a:off x="4289867" y="2741555"/>
+            <a:ext cx="7086600" cy="1655762"/>
           </a:xfrm>
         </p:spPr>
         <p:txBody>
@@ -10611,649 +11483,38 @@
           </a:bodyPr>
           <a:lstStyle/>
           <a:p>
-            <a:pPr>
-              <a:defRPr sz="1800">
-                <a:solidFill>
-                  <a:srgbClr val="000000"/>
-                </a:solidFill>
-              </a:defRPr>
-            </a:pPr>
-            <a:r>
-              <a:rPr lang="en-US" sz="2800" dirty="0" smtClean="0">
-                <a:solidFill>
-                  <a:srgbClr val="8E8E93"/>
-                </a:solidFill>
-              </a:rPr>
-              <a:t>Syntax</a:t>
-            </a:r>
-            <a:endParaRPr lang="en-US" sz="2800" dirty="0">
-              <a:solidFill>
-                <a:srgbClr val="8E8E93"/>
-              </a:solidFill>
-            </a:endParaRPr>
-          </a:p>
-          <a:p>
-            <a:pPr lvl="1">
-              <a:defRPr sz="1800">
-                <a:solidFill>
-                  <a:srgbClr val="000000"/>
-                </a:solidFill>
-              </a:defRPr>
-            </a:pPr>
-            <a:r>
-              <a:rPr lang="en-US" sz="2400" dirty="0" smtClean="0">
-                <a:solidFill>
-                  <a:srgbClr val="8E8E93"/>
-                </a:solidFill>
-              </a:rPr>
-              <a:t>SQL-inspired and ASCII-based</a:t>
-            </a:r>
-          </a:p>
-          <a:p>
-            <a:pPr lvl="1">
-              <a:defRPr sz="1800">
-                <a:solidFill>
-                  <a:srgbClr val="000000"/>
-                </a:solidFill>
-              </a:defRPr>
-            </a:pPr>
-            <a:r>
-              <a:rPr lang="en-US" sz="2400" dirty="0" smtClean="0">
-                <a:solidFill>
-                  <a:srgbClr val="8E8E93"/>
-                </a:solidFill>
-              </a:rPr>
-              <a:t>Nodes are drawn with parentheses</a:t>
-            </a:r>
-          </a:p>
-          <a:p>
-            <a:pPr lvl="1">
-              <a:defRPr sz="1800">
-                <a:solidFill>
-                  <a:srgbClr val="000000"/>
-                </a:solidFill>
-              </a:defRPr>
-            </a:pPr>
-            <a:r>
-              <a:rPr lang="en-US" sz="2400" dirty="0" smtClean="0">
-                <a:solidFill>
-                  <a:srgbClr val="8E8E93"/>
-                </a:solidFill>
-              </a:rPr>
-              <a:t>Relationships are drawn with square brackets, and can be </a:t>
-            </a:r>
-            <a:r>
-              <a:rPr lang="en-US" sz="2400" dirty="0" err="1" smtClean="0">
-                <a:solidFill>
-                  <a:srgbClr val="8E8E93"/>
-                </a:solidFill>
-              </a:rPr>
-              <a:t>uni</a:t>
-            </a:r>
-            <a:r>
-              <a:rPr lang="en-US" sz="2400" dirty="0" smtClean="0">
-                <a:solidFill>
-                  <a:srgbClr val="8E8E93"/>
-                </a:solidFill>
-              </a:rPr>
-              <a:t>- or non-directional</a:t>
-            </a:r>
-          </a:p>
-          <a:p>
-            <a:pPr lvl="1">
-              <a:defRPr sz="1800">
-                <a:solidFill>
-                  <a:srgbClr val="000000"/>
-                </a:solidFill>
-              </a:defRPr>
-            </a:pPr>
-            <a:r>
-              <a:rPr lang="en-US" sz="2400" dirty="0" smtClean="0">
-                <a:solidFill>
-                  <a:srgbClr val="8E8E93"/>
-                </a:solidFill>
-              </a:rPr>
-              <a:t>Labels (nodes) or Relationship Types (relationships) are drawn as :Label</a:t>
-            </a:r>
-            <a:endParaRPr lang="en-US" sz="2400" dirty="0">
-              <a:solidFill>
-                <a:srgbClr val="8E8E93"/>
-              </a:solidFill>
-            </a:endParaRPr>
-          </a:p>
-        </p:txBody>
-      </p:sp>
-      <p:sp>
-        <p:nvSpPr>
-          <p:cNvPr id="4" name="Content Placeholder 2"/>
-          <p:cNvSpPr txBox="1">
-            <a:spLocks/>
-          </p:cNvSpPr>
-          <p:nvPr/>
-        </p:nvSpPr>
-        <p:spPr>
-          <a:xfrm>
-            <a:off x="7125731" y="1448994"/>
-            <a:ext cx="4895694" cy="3760569"/>
-          </a:xfrm>
-          <a:prstGeom prst="rect">
-            <a:avLst/>
-          </a:prstGeom>
-        </p:spPr>
-        <p:txBody>
-          <a:bodyPr vert="horz" lIns="91440" tIns="45720" rIns="91440" bIns="45720" rtlCol="0">
-            <a:normAutofit/>
-          </a:bodyPr>
-          <a:lstStyle>
-            <a:lvl1pPr marL="228600" indent="-228600" algn="l" defTabSz="914400" rtl="0" eaLnBrk="1" latinLnBrk="0" hangingPunct="1">
-              <a:lnSpc>
-                <a:spcPct val="100000"/>
-              </a:lnSpc>
-              <a:spcBef>
-                <a:spcPts val="1000"/>
-              </a:spcBef>
-              <a:buClr>
-                <a:schemeClr val="tx2"/>
-              </a:buClr>
-              <a:buFont typeface="Arial" panose="020B0604020202020204" pitchFamily="34" charset="0"/>
-              <a:buChar char="•"/>
-              <a:defRPr sz="2400" b="0" i="0" kern="1200" baseline="0">
-                <a:solidFill>
-                  <a:schemeClr val="tx2"/>
-                </a:solidFill>
-                <a:latin typeface="Helvetica Light"/>
-                <a:ea typeface="+mn-ea"/>
-                <a:cs typeface="Helvetica Light"/>
-              </a:defRPr>
-            </a:lvl1pPr>
-            <a:lvl2pPr marL="800100" indent="-342900" algn="l" defTabSz="914400" rtl="0" eaLnBrk="1" latinLnBrk="0" hangingPunct="1">
-              <a:lnSpc>
-                <a:spcPct val="100000"/>
-              </a:lnSpc>
-              <a:spcBef>
-                <a:spcPts val="500"/>
-              </a:spcBef>
-              <a:buClr>
-                <a:schemeClr val="tx2"/>
-              </a:buClr>
-              <a:buSzPct val="75000"/>
-              <a:buFont typeface="Lucida Grande"/>
-              <a:buChar char="‣"/>
-              <a:defRPr sz="2000" b="0" i="0" kern="1200">
-                <a:solidFill>
-                  <a:schemeClr val="tx2"/>
-                </a:solidFill>
-                <a:latin typeface="Helvetica Light"/>
-                <a:ea typeface="+mn-ea"/>
-                <a:cs typeface="Helvetica Light"/>
-              </a:defRPr>
-            </a:lvl2pPr>
-            <a:lvl3pPr marL="1143000" indent="-228600" algn="l" defTabSz="914400" rtl="0" eaLnBrk="1" latinLnBrk="0" hangingPunct="1">
-              <a:lnSpc>
-                <a:spcPct val="100000"/>
-              </a:lnSpc>
-              <a:spcBef>
-                <a:spcPts val="500"/>
-              </a:spcBef>
-              <a:buClr>
-                <a:schemeClr val="tx2"/>
-              </a:buClr>
-              <a:buSzPct val="75000"/>
-              <a:buFont typeface="Lucida Grande"/>
-              <a:buChar char="‣"/>
-              <a:defRPr sz="1800" b="0" i="0" kern="1200">
-                <a:solidFill>
-                  <a:schemeClr val="tx2"/>
-                </a:solidFill>
-                <a:latin typeface="Helvetica Light"/>
-                <a:ea typeface="+mn-ea"/>
-                <a:cs typeface="Helvetica Light"/>
-              </a:defRPr>
-            </a:lvl3pPr>
-            <a:lvl4pPr marL="1600200" indent="-228600" algn="l" defTabSz="914400" rtl="0" eaLnBrk="1" latinLnBrk="0" hangingPunct="1">
-              <a:lnSpc>
-                <a:spcPct val="100000"/>
-              </a:lnSpc>
-              <a:spcBef>
-                <a:spcPts val="500"/>
-              </a:spcBef>
-              <a:buClr>
-                <a:schemeClr val="tx2"/>
-              </a:buClr>
-              <a:buSzPct val="75000"/>
-              <a:buFont typeface="Lucida Grande"/>
-              <a:buChar char="‣"/>
-              <a:defRPr sz="1600" b="0" i="0" kern="1200">
-                <a:solidFill>
-                  <a:schemeClr val="tx2"/>
-                </a:solidFill>
-                <a:latin typeface="Helvetica Light"/>
-                <a:ea typeface="+mn-ea"/>
-                <a:cs typeface="Helvetica Light"/>
-              </a:defRPr>
-            </a:lvl4pPr>
-            <a:lvl5pPr marL="2057400" indent="-228600" algn="l" defTabSz="914400" rtl="0" eaLnBrk="1" latinLnBrk="0" hangingPunct="1">
-              <a:lnSpc>
-                <a:spcPct val="100000"/>
-              </a:lnSpc>
-              <a:spcBef>
-                <a:spcPts val="500"/>
-              </a:spcBef>
-              <a:buClr>
-                <a:schemeClr val="tx2"/>
-              </a:buClr>
-              <a:buSzPct val="75000"/>
-              <a:buFont typeface="Lucida Grande"/>
-              <a:buChar char="‣"/>
-              <a:defRPr sz="1600" b="0" i="0" kern="1200">
-                <a:solidFill>
-                  <a:schemeClr val="tx2"/>
-                </a:solidFill>
-                <a:latin typeface="Helvetica Light"/>
-                <a:ea typeface="+mn-ea"/>
-                <a:cs typeface="Helvetica Light"/>
-              </a:defRPr>
-            </a:lvl5pPr>
-            <a:lvl6pPr marL="2514600" indent="-228600" algn="l" defTabSz="914400" rtl="0" eaLnBrk="1" latinLnBrk="0" hangingPunct="1">
-              <a:lnSpc>
-                <a:spcPct val="90000"/>
-              </a:lnSpc>
-              <a:spcBef>
-                <a:spcPts val="500"/>
-              </a:spcBef>
-              <a:buFont typeface="Arial" panose="020B0604020202020204" pitchFamily="34" charset="0"/>
-              <a:buChar char="•"/>
-              <a:defRPr sz="1800" kern="1200">
-                <a:solidFill>
-                  <a:schemeClr val="tx1"/>
-                </a:solidFill>
-                <a:latin typeface="+mn-lt"/>
-                <a:ea typeface="+mn-ea"/>
-                <a:cs typeface="+mn-cs"/>
-              </a:defRPr>
-            </a:lvl6pPr>
-            <a:lvl7pPr marL="2971800" indent="-228600" algn="l" defTabSz="914400" rtl="0" eaLnBrk="1" latinLnBrk="0" hangingPunct="1">
-              <a:lnSpc>
-                <a:spcPct val="90000"/>
-              </a:lnSpc>
-              <a:spcBef>
-                <a:spcPts val="500"/>
-              </a:spcBef>
-              <a:buFont typeface="Arial" panose="020B0604020202020204" pitchFamily="34" charset="0"/>
-              <a:buChar char="•"/>
-              <a:defRPr sz="1800" kern="1200">
-                <a:solidFill>
-                  <a:schemeClr val="tx1"/>
-                </a:solidFill>
-                <a:latin typeface="+mn-lt"/>
-                <a:ea typeface="+mn-ea"/>
-                <a:cs typeface="+mn-cs"/>
-              </a:defRPr>
-            </a:lvl7pPr>
-            <a:lvl8pPr marL="3429000" indent="-228600" algn="l" defTabSz="914400" rtl="0" eaLnBrk="1" latinLnBrk="0" hangingPunct="1">
-              <a:lnSpc>
-                <a:spcPct val="90000"/>
-              </a:lnSpc>
-              <a:spcBef>
-                <a:spcPts val="500"/>
-              </a:spcBef>
-              <a:buFont typeface="Arial" panose="020B0604020202020204" pitchFamily="34" charset="0"/>
-              <a:buChar char="•"/>
-              <a:defRPr sz="1800" kern="1200">
-                <a:solidFill>
-                  <a:schemeClr val="tx1"/>
-                </a:solidFill>
-                <a:latin typeface="+mn-lt"/>
-                <a:ea typeface="+mn-ea"/>
-                <a:cs typeface="+mn-cs"/>
-              </a:defRPr>
-            </a:lvl8pPr>
-            <a:lvl9pPr marL="3886200" indent="-228600" algn="l" defTabSz="914400" rtl="0" eaLnBrk="1" latinLnBrk="0" hangingPunct="1">
-              <a:lnSpc>
-                <a:spcPct val="90000"/>
-              </a:lnSpc>
-              <a:spcBef>
-                <a:spcPts val="500"/>
-              </a:spcBef>
-              <a:buFont typeface="Arial" panose="020B0604020202020204" pitchFamily="34" charset="0"/>
-              <a:buChar char="•"/>
-              <a:defRPr sz="1800" kern="1200">
-                <a:solidFill>
-                  <a:schemeClr val="tx1"/>
-                </a:solidFill>
-                <a:latin typeface="+mn-lt"/>
-                <a:ea typeface="+mn-ea"/>
-                <a:cs typeface="+mn-cs"/>
-              </a:defRPr>
-            </a:lvl9pPr>
-          </a:lstStyle>
-          <a:p>
-            <a:pPr marL="0" indent="0">
-              <a:buNone/>
-              <a:defRPr sz="1800">
-                <a:solidFill>
-                  <a:srgbClr val="000000"/>
-                </a:solidFill>
-              </a:defRPr>
-            </a:pPr>
-            <a:r>
-              <a:rPr lang="en-US" sz="2800" dirty="0" smtClean="0">
-                <a:solidFill>
-                  <a:srgbClr val="8E8E93"/>
-                </a:solidFill>
-                <a:latin typeface="OCR A Std" panose="020F0609000104060307" pitchFamily="49" charset="0"/>
-                <a:cs typeface="MoolBoran" panose="020B0100010101010101" pitchFamily="34" charset="0"/>
-              </a:rPr>
-              <a:t>( ) – [ ] – ( )</a:t>
-            </a:r>
-          </a:p>
-          <a:p>
-            <a:pPr marL="0" indent="0">
-              <a:buNone/>
-              <a:defRPr sz="1800">
-                <a:solidFill>
-                  <a:srgbClr val="000000"/>
-                </a:solidFill>
-              </a:defRPr>
-            </a:pPr>
-            <a:r>
-              <a:rPr lang="en-US" sz="2800" dirty="0" smtClean="0">
-                <a:solidFill>
-                  <a:srgbClr val="8E8E93"/>
-                </a:solidFill>
-                <a:latin typeface="OCR A Std" panose="020F0609000104060307" pitchFamily="49" charset="0"/>
-                <a:cs typeface="MoolBoran" panose="020B0100010101010101" pitchFamily="34" charset="0"/>
-              </a:rPr>
-              <a:t>( ) – [ ] -&gt; ( )</a:t>
-            </a:r>
-          </a:p>
-          <a:p>
-            <a:pPr marL="0" indent="0">
-              <a:buNone/>
-              <a:defRPr sz="1800">
-                <a:solidFill>
-                  <a:srgbClr val="000000"/>
-                </a:solidFill>
-              </a:defRPr>
-            </a:pPr>
-            <a:r>
-              <a:rPr lang="en-US" sz="2800" dirty="0" smtClean="0">
-                <a:solidFill>
-                  <a:srgbClr val="8E8E93"/>
-                </a:solidFill>
-                <a:latin typeface="OCR A Std" panose="020F0609000104060307" pitchFamily="49" charset="0"/>
-                <a:cs typeface="MoolBoran" panose="020B0100010101010101" pitchFamily="34" charset="0"/>
-              </a:rPr>
-              <a:t>( ) &lt;- [ ] – ( )</a:t>
-            </a:r>
-          </a:p>
-          <a:p>
-            <a:pPr marL="0" indent="0">
-              <a:buNone/>
-              <a:defRPr sz="1800">
-                <a:solidFill>
-                  <a:srgbClr val="000000"/>
-                </a:solidFill>
-              </a:defRPr>
-            </a:pPr>
-            <a:endParaRPr lang="en-US" sz="2800" dirty="0" smtClean="0">
-              <a:solidFill>
-                <a:srgbClr val="8E8E93"/>
-              </a:solidFill>
-              <a:latin typeface="OCR A Std" panose="020F0609000104060307" pitchFamily="49" charset="0"/>
-              <a:cs typeface="MoolBoran" panose="020B0100010101010101" pitchFamily="34" charset="0"/>
-            </a:endParaRPr>
-          </a:p>
-          <a:p>
-            <a:pPr marL="0" indent="0">
-              <a:buNone/>
-              <a:defRPr sz="1800">
-                <a:solidFill>
-                  <a:srgbClr val="000000"/>
-                </a:solidFill>
-              </a:defRPr>
-            </a:pPr>
-            <a:r>
-              <a:rPr lang="en-US" sz="1200" dirty="0" smtClean="0">
-                <a:solidFill>
-                  <a:srgbClr val="8E8E93"/>
-                </a:solidFill>
-                <a:latin typeface="OCR A Std" panose="020F0609000104060307" pitchFamily="49" charset="0"/>
-                <a:cs typeface="MoolBoran" panose="020B0100010101010101" pitchFamily="34" charset="0"/>
-              </a:rPr>
-              <a:t>CREATE (</a:t>
-            </a:r>
-            <a:r>
-              <a:rPr lang="en-US" sz="1200" dirty="0" err="1" smtClean="0">
-                <a:solidFill>
-                  <a:srgbClr val="8E8E93"/>
-                </a:solidFill>
-                <a:latin typeface="OCR A Std" panose="020F0609000104060307" pitchFamily="49" charset="0"/>
-                <a:cs typeface="MoolBoran" panose="020B0100010101010101" pitchFamily="34" charset="0"/>
-              </a:rPr>
-              <a:t>m:Movie</a:t>
-            </a:r>
-            <a:r>
-              <a:rPr lang="en-US" sz="1200" dirty="0" smtClean="0">
-                <a:solidFill>
-                  <a:srgbClr val="8E8E93"/>
-                </a:solidFill>
-                <a:latin typeface="OCR A Std" panose="020F0609000104060307" pitchFamily="49" charset="0"/>
-                <a:cs typeface="MoolBoran" panose="020B0100010101010101" pitchFamily="34" charset="0"/>
-              </a:rPr>
-              <a:t> { name: ‘</a:t>
-            </a:r>
-            <a:r>
-              <a:rPr lang="en-US" sz="1200" dirty="0" err="1" smtClean="0">
-                <a:solidFill>
-                  <a:srgbClr val="8E8E93"/>
-                </a:solidFill>
-                <a:latin typeface="OCR A Std" panose="020F0609000104060307" pitchFamily="49" charset="0"/>
-                <a:cs typeface="MoolBoran" panose="020B0100010101010101" pitchFamily="34" charset="0"/>
-              </a:rPr>
-              <a:t>Deadpool</a:t>
-            </a:r>
-            <a:r>
-              <a:rPr lang="en-US" sz="1200" dirty="0" smtClean="0">
-                <a:solidFill>
-                  <a:srgbClr val="8E8E93"/>
-                </a:solidFill>
-                <a:latin typeface="OCR A Std" panose="020F0609000104060307" pitchFamily="49" charset="0"/>
-                <a:cs typeface="MoolBoran" panose="020B0100010101010101" pitchFamily="34" charset="0"/>
-              </a:rPr>
-              <a:t>’ })</a:t>
-            </a:r>
-          </a:p>
-          <a:p>
-            <a:pPr marL="0" indent="0">
-              <a:buNone/>
-              <a:defRPr sz="1800">
-                <a:solidFill>
-                  <a:srgbClr val="000000"/>
-                </a:solidFill>
-              </a:defRPr>
-            </a:pPr>
-            <a:endParaRPr lang="en-US" sz="1200" dirty="0" smtClean="0">
-              <a:solidFill>
-                <a:srgbClr val="8E8E93"/>
-              </a:solidFill>
-              <a:latin typeface="OCR A Std" panose="020F0609000104060307" pitchFamily="49" charset="0"/>
-              <a:cs typeface="MoolBoran" panose="020B0100010101010101" pitchFamily="34" charset="0"/>
-            </a:endParaRPr>
-          </a:p>
-          <a:p>
-            <a:pPr marL="0" indent="0">
-              <a:buNone/>
-              <a:defRPr sz="1800">
-                <a:solidFill>
-                  <a:srgbClr val="000000"/>
-                </a:solidFill>
-              </a:defRPr>
-            </a:pPr>
-            <a:r>
-              <a:rPr lang="en-US" sz="1200" dirty="0" smtClean="0">
-                <a:solidFill>
-                  <a:srgbClr val="8E8E93"/>
-                </a:solidFill>
-                <a:latin typeface="OCR A Std" panose="020F0609000104060307" pitchFamily="49" charset="0"/>
-                <a:cs typeface="MoolBoran" panose="020B0100010101010101" pitchFamily="34" charset="0"/>
-              </a:rPr>
-              <a:t>MATCH (</a:t>
-            </a:r>
-            <a:r>
-              <a:rPr lang="en-US" sz="1200" dirty="0" err="1" smtClean="0">
-                <a:solidFill>
-                  <a:srgbClr val="8E8E93"/>
-                </a:solidFill>
-                <a:latin typeface="OCR A Std" panose="020F0609000104060307" pitchFamily="49" charset="0"/>
-                <a:cs typeface="MoolBoran" panose="020B0100010101010101" pitchFamily="34" charset="0"/>
-              </a:rPr>
-              <a:t>a:Actor</a:t>
-            </a:r>
-            <a:r>
-              <a:rPr lang="en-US" sz="1200" dirty="0" smtClean="0">
-                <a:solidFill>
-                  <a:srgbClr val="8E8E93"/>
-                </a:solidFill>
-                <a:latin typeface="OCR A Std" panose="020F0609000104060307" pitchFamily="49" charset="0"/>
-                <a:cs typeface="MoolBoran" panose="020B0100010101010101" pitchFamily="34" charset="0"/>
-              </a:rPr>
-              <a:t>)-[</a:t>
-            </a:r>
-            <a:r>
-              <a:rPr lang="en-US" sz="1200" dirty="0" err="1" smtClean="0">
-                <a:solidFill>
-                  <a:srgbClr val="8E8E93"/>
-                </a:solidFill>
-                <a:latin typeface="OCR A Std" panose="020F0609000104060307" pitchFamily="49" charset="0"/>
-                <a:cs typeface="MoolBoran" panose="020B0100010101010101" pitchFamily="34" charset="0"/>
-              </a:rPr>
-              <a:t>r:ACTED_IN</a:t>
-            </a:r>
-            <a:r>
-              <a:rPr lang="en-US" sz="1200" dirty="0" smtClean="0">
-                <a:solidFill>
-                  <a:srgbClr val="8E8E93"/>
-                </a:solidFill>
-                <a:latin typeface="OCR A Std" panose="020F0609000104060307" pitchFamily="49" charset="0"/>
-                <a:cs typeface="MoolBoran" panose="020B0100010101010101" pitchFamily="34" charset="0"/>
-              </a:rPr>
-              <a:t>]-&gt;(</a:t>
-            </a:r>
-            <a:r>
-              <a:rPr lang="en-US" sz="1200" dirty="0" err="1" smtClean="0">
-                <a:solidFill>
-                  <a:srgbClr val="8E8E93"/>
-                </a:solidFill>
-                <a:latin typeface="OCR A Std" panose="020F0609000104060307" pitchFamily="49" charset="0"/>
-                <a:cs typeface="MoolBoran" panose="020B0100010101010101" pitchFamily="34" charset="0"/>
-              </a:rPr>
-              <a:t>m:Movie</a:t>
-            </a:r>
-            <a:r>
-              <a:rPr lang="en-US" sz="1200" dirty="0" smtClean="0">
-                <a:solidFill>
-                  <a:srgbClr val="8E8E93"/>
-                </a:solidFill>
-                <a:latin typeface="OCR A Std" panose="020F0609000104060307" pitchFamily="49" charset="0"/>
-                <a:cs typeface="MoolBoran" panose="020B0100010101010101" pitchFamily="34" charset="0"/>
-              </a:rPr>
-              <a:t>)</a:t>
-            </a:r>
-          </a:p>
-          <a:p>
-            <a:pPr marL="0" indent="0">
-              <a:buNone/>
-              <a:defRPr sz="1800">
-                <a:solidFill>
-                  <a:srgbClr val="000000"/>
-                </a:solidFill>
-              </a:defRPr>
-            </a:pPr>
-            <a:r>
-              <a:rPr lang="en-US" sz="1200" dirty="0" smtClean="0">
-                <a:solidFill>
-                  <a:srgbClr val="8E8E93"/>
-                </a:solidFill>
-                <a:latin typeface="OCR A Std" panose="020F0609000104060307" pitchFamily="49" charset="0"/>
-                <a:cs typeface="MoolBoran" panose="020B0100010101010101" pitchFamily="34" charset="0"/>
-              </a:rPr>
-              <a:t>WHERE </a:t>
-            </a:r>
-            <a:r>
-              <a:rPr lang="en-US" sz="1200" dirty="0" err="1" smtClean="0">
-                <a:solidFill>
-                  <a:srgbClr val="8E8E93"/>
-                </a:solidFill>
-                <a:latin typeface="OCR A Std" panose="020F0609000104060307" pitchFamily="49" charset="0"/>
-                <a:cs typeface="MoolBoran" panose="020B0100010101010101" pitchFamily="34" charset="0"/>
-              </a:rPr>
-              <a:t>m.Movie</a:t>
-            </a:r>
-            <a:r>
-              <a:rPr lang="en-US" sz="1200" dirty="0" smtClean="0">
-                <a:solidFill>
-                  <a:srgbClr val="8E8E93"/>
-                </a:solidFill>
-                <a:latin typeface="OCR A Std" panose="020F0609000104060307" pitchFamily="49" charset="0"/>
-                <a:cs typeface="MoolBoran" panose="020B0100010101010101" pitchFamily="34" charset="0"/>
-              </a:rPr>
-              <a:t> = ‘</a:t>
-            </a:r>
-            <a:r>
-              <a:rPr lang="en-US" sz="1200" dirty="0" err="1" smtClean="0">
-                <a:solidFill>
-                  <a:srgbClr val="8E8E93"/>
-                </a:solidFill>
-                <a:latin typeface="OCR A Std" panose="020F0609000104060307" pitchFamily="49" charset="0"/>
-                <a:cs typeface="MoolBoran" panose="020B0100010101010101" pitchFamily="34" charset="0"/>
-              </a:rPr>
-              <a:t>Deadpool</a:t>
-            </a:r>
-            <a:r>
-              <a:rPr lang="en-US" sz="1200" dirty="0" smtClean="0">
-                <a:solidFill>
-                  <a:srgbClr val="8E8E93"/>
-                </a:solidFill>
-                <a:latin typeface="OCR A Std" panose="020F0609000104060307" pitchFamily="49" charset="0"/>
-                <a:cs typeface="MoolBoran" panose="020B0100010101010101" pitchFamily="34" charset="0"/>
-              </a:rPr>
-              <a:t>’</a:t>
-            </a:r>
-            <a:endParaRPr lang="en-US" sz="1200" dirty="0">
-              <a:solidFill>
-                <a:srgbClr val="8E8E93"/>
-              </a:solidFill>
-              <a:latin typeface="OCR A Std" panose="020F0609000104060307" pitchFamily="49" charset="0"/>
-              <a:cs typeface="MoolBoran" panose="020B0100010101010101" pitchFamily="34" charset="0"/>
-            </a:endParaRPr>
-          </a:p>
-          <a:p>
-            <a:pPr marL="0" indent="0">
-              <a:buNone/>
-              <a:defRPr sz="1800">
-                <a:solidFill>
-                  <a:srgbClr val="000000"/>
-                </a:solidFill>
-              </a:defRPr>
-            </a:pPr>
-            <a:r>
-              <a:rPr lang="en-US" sz="1200" dirty="0" smtClean="0">
-                <a:solidFill>
-                  <a:srgbClr val="8E8E93"/>
-                </a:solidFill>
-                <a:latin typeface="OCR A Std" panose="020F0609000104060307" pitchFamily="49" charset="0"/>
-                <a:cs typeface="MoolBoran" panose="020B0100010101010101" pitchFamily="34" charset="0"/>
-              </a:rPr>
-              <a:t>RETURN a, r, m</a:t>
-            </a:r>
+            <a:r>
+              <a:rPr lang="en-US" sz="900" b="0" dirty="0" smtClean="0"/>
+              <a:t>(</a:t>
+            </a:r>
+            <a:r>
+              <a:rPr lang="en-US" sz="900" b="0" dirty="0" err="1" smtClean="0"/>
+              <a:t>p:Person</a:t>
+            </a:r>
+            <a:r>
+              <a:rPr lang="en-US" sz="900" b="0" dirty="0"/>
+              <a:t> </a:t>
+            </a:r>
+            <a:r>
+              <a:rPr lang="en-US" sz="900" b="0" dirty="0" smtClean="0"/>
+              <a:t>{ name: ‘Brandon’ })-[:Likes]-&gt;(</a:t>
+            </a:r>
+            <a:r>
+              <a:rPr lang="en-US" sz="900" b="0" dirty="0" err="1" smtClean="0"/>
+              <a:t>l:Language</a:t>
+            </a:r>
+            <a:r>
+              <a:rPr lang="en-US" sz="900" b="0" dirty="0" smtClean="0"/>
+              <a:t> { name: ‘Cypher’ })</a:t>
+            </a:r>
+            <a:endParaRPr lang="en-US" sz="900" dirty="0"/>
           </a:p>
         </p:txBody>
       </p:sp>
     </p:spTree>
     <p:extLst>
       <p:ext uri="{BB962C8B-B14F-4D97-AF65-F5344CB8AC3E}">
-        <p14:creationId xmlns:p14="http://schemas.microsoft.com/office/powerpoint/2010/main" val="309578627"/>
+        <p14:creationId xmlns:p14="http://schemas.microsoft.com/office/powerpoint/2010/main" val="3110814148"/>
       </p:ext>
     </p:extLst>
   </p:cSld>
@@ -11290,33 +11551,166 @@
           <a:chExt cx="0" cy="0"/>
         </a:xfrm>
       </p:grpSpPr>
-      <p:pic>
-        <p:nvPicPr>
-          <p:cNvPr id="5" name="Picture 4"/>
-          <p:cNvPicPr>
-            <a:picLocks noChangeAspect="1"/>
-          </p:cNvPicPr>
-          <p:nvPr/>
-        </p:nvPicPr>
-        <p:blipFill>
-          <a:blip r:embed="rId3"/>
-          <a:stretch>
-            <a:fillRect/>
-          </a:stretch>
-        </p:blipFill>
-        <p:spPr>
-          <a:xfrm>
-            <a:off x="3133319" y="1782726"/>
-            <a:ext cx="5811061" cy="3248478"/>
-          </a:xfrm>
-          <a:prstGeom prst="rect">
-            <a:avLst/>
-          </a:prstGeom>
-        </p:spPr>
-      </p:pic>
-      <p:sp>
-        <p:nvSpPr>
-          <p:cNvPr id="8" name="Title 1"/>
+      <p:sp>
+        <p:nvSpPr>
+          <p:cNvPr id="2" name="Title 1"/>
+          <p:cNvSpPr>
+            <a:spLocks noGrp="1"/>
+          </p:cNvSpPr>
+          <p:nvPr>
+            <p:ph type="title"/>
+          </p:nvPr>
+        </p:nvSpPr>
+        <p:spPr/>
+        <p:txBody>
+          <a:bodyPr/>
+          <a:lstStyle/>
+          <a:p>
+            <a:r>
+              <a:rPr lang="en-US" dirty="0" smtClean="0"/>
+              <a:t>The Basics of Cypher</a:t>
+            </a:r>
+            <a:endParaRPr lang="en-US" dirty="0"/>
+          </a:p>
+        </p:txBody>
+      </p:sp>
+      <p:sp>
+        <p:nvSpPr>
+          <p:cNvPr id="3" name="Content Placeholder 2"/>
+          <p:cNvSpPr>
+            <a:spLocks noGrp="1"/>
+          </p:cNvSpPr>
+          <p:nvPr>
+            <p:ph idx="1"/>
+          </p:nvPr>
+        </p:nvSpPr>
+        <p:spPr>
+          <a:xfrm>
+            <a:off x="457201" y="1261872"/>
+            <a:ext cx="6668530" cy="3947691"/>
+          </a:xfrm>
+        </p:spPr>
+        <p:txBody>
+          <a:bodyPr>
+            <a:normAutofit/>
+          </a:bodyPr>
+          <a:lstStyle/>
+          <a:p>
+            <a:pPr>
+              <a:defRPr sz="1800">
+                <a:solidFill>
+                  <a:srgbClr val="000000"/>
+                </a:solidFill>
+              </a:defRPr>
+            </a:pPr>
+            <a:r>
+              <a:rPr lang="en-US" sz="2800" dirty="0" smtClean="0">
+                <a:solidFill>
+                  <a:srgbClr val="8E8E93"/>
+                </a:solidFill>
+              </a:rPr>
+              <a:t>Syntax</a:t>
+            </a:r>
+            <a:endParaRPr lang="en-US" sz="2800" dirty="0">
+              <a:solidFill>
+                <a:srgbClr val="8E8E93"/>
+              </a:solidFill>
+            </a:endParaRPr>
+          </a:p>
+          <a:p>
+            <a:pPr lvl="1">
+              <a:defRPr sz="1800">
+                <a:solidFill>
+                  <a:srgbClr val="000000"/>
+                </a:solidFill>
+              </a:defRPr>
+            </a:pPr>
+            <a:r>
+              <a:rPr lang="en-US" sz="2400" dirty="0" smtClean="0">
+                <a:solidFill>
+                  <a:srgbClr val="8E8E93"/>
+                </a:solidFill>
+              </a:rPr>
+              <a:t>SQL-inspired and ASCII-based</a:t>
+            </a:r>
+          </a:p>
+          <a:p>
+            <a:pPr lvl="1">
+              <a:defRPr sz="1800">
+                <a:solidFill>
+                  <a:srgbClr val="000000"/>
+                </a:solidFill>
+              </a:defRPr>
+            </a:pPr>
+            <a:r>
+              <a:rPr lang="en-US" sz="2400" dirty="0" smtClean="0">
+                <a:solidFill>
+                  <a:srgbClr val="8E8E93"/>
+                </a:solidFill>
+              </a:rPr>
+              <a:t>Nodes are drawn with parentheses</a:t>
+            </a:r>
+          </a:p>
+          <a:p>
+            <a:pPr lvl="1">
+              <a:defRPr sz="1800">
+                <a:solidFill>
+                  <a:srgbClr val="000000"/>
+                </a:solidFill>
+              </a:defRPr>
+            </a:pPr>
+            <a:r>
+              <a:rPr lang="en-US" sz="2400" dirty="0" smtClean="0">
+                <a:solidFill>
+                  <a:srgbClr val="8E8E93"/>
+                </a:solidFill>
+              </a:rPr>
+              <a:t>Relationships are drawn with square brackets, and can be </a:t>
+            </a:r>
+            <a:r>
+              <a:rPr lang="en-US" sz="2400" dirty="0" err="1" smtClean="0">
+                <a:solidFill>
+                  <a:srgbClr val="8E8E93"/>
+                </a:solidFill>
+              </a:rPr>
+              <a:t>uni</a:t>
+            </a:r>
+            <a:r>
+              <a:rPr lang="en-US" sz="2400" dirty="0" smtClean="0">
+                <a:solidFill>
+                  <a:srgbClr val="8E8E93"/>
+                </a:solidFill>
+              </a:rPr>
+              <a:t>- or non-directional</a:t>
+            </a:r>
+          </a:p>
+          <a:p>
+            <a:pPr lvl="1">
+              <a:defRPr sz="1800">
+                <a:solidFill>
+                  <a:srgbClr val="000000"/>
+                </a:solidFill>
+              </a:defRPr>
+            </a:pPr>
+            <a:r>
+              <a:rPr lang="en-US" sz="2400" dirty="0" smtClean="0">
+                <a:solidFill>
+                  <a:srgbClr val="8E8E93"/>
+                </a:solidFill>
+              </a:rPr>
+              <a:t>Labels (nodes) or Relationship Types (relationships) are drawn as :Label</a:t>
+            </a:r>
+            <a:endParaRPr lang="en-US" sz="2400" dirty="0">
+              <a:solidFill>
+                <a:srgbClr val="8E8E93"/>
+              </a:solidFill>
+            </a:endParaRPr>
+          </a:p>
+        </p:txBody>
+      </p:sp>
+      <p:sp>
+        <p:nvSpPr>
+          <p:cNvPr id="4" name="Content Placeholder 2"/>
           <p:cNvSpPr txBox="1">
             <a:spLocks/>
           </p:cNvSpPr>
@@ -11324,50 +11718,527 @@
         </p:nvSpPr>
         <p:spPr>
           <a:xfrm>
-            <a:off x="457200" y="228600"/>
-            <a:ext cx="10287000" cy="914400"/>
+            <a:off x="7125731" y="1448994"/>
+            <a:ext cx="4895694" cy="3760569"/>
           </a:xfrm>
           <a:prstGeom prst="rect">
             <a:avLst/>
           </a:prstGeom>
         </p:spPr>
         <p:txBody>
-          <a:bodyPr vert="horz" lIns="91440" tIns="45720" rIns="91440" bIns="45720" rtlCol="0" anchor="ctr">
+          <a:bodyPr vert="horz" lIns="91440" tIns="45720" rIns="91440" bIns="45720" rtlCol="0">
             <a:normAutofit/>
           </a:bodyPr>
           <a:lstStyle>
-            <a:lvl1pPr algn="l" defTabSz="412740" rtl="0" eaLnBrk="1" latinLnBrk="0" hangingPunct="1">
+            <a:lvl1pPr marL="228600" indent="-228600" algn="l" defTabSz="914400" rtl="0" eaLnBrk="1" latinLnBrk="0" hangingPunct="1">
               <a:lnSpc>
                 <a:spcPct val="100000"/>
               </a:lnSpc>
               <a:spcBef>
-                <a:spcPct val="0"/>
+                <a:spcPts val="1000"/>
               </a:spcBef>
-              <a:buNone/>
-              <a:defRPr lang="en-US" sz="3600" b="1" i="0" kern="1200" spc="-72" dirty="0">
-                <a:solidFill>
-                  <a:schemeClr val="tx1"/>
-                </a:solidFill>
-                <a:latin typeface="Helvetica"/>
-                <a:ea typeface="+mj-ea"/>
-                <a:cs typeface="Helvetica"/>
-                <a:sym typeface="Helvetica"/>
+              <a:buClr>
+                <a:schemeClr val="tx2"/>
+              </a:buClr>
+              <a:buFont typeface="Arial" panose="020B0604020202020204" pitchFamily="34" charset="0"/>
+              <a:buChar char="•"/>
+              <a:defRPr sz="2400" b="0" i="0" kern="1200" baseline="0">
+                <a:solidFill>
+                  <a:schemeClr val="tx2"/>
+                </a:solidFill>
+                <a:latin typeface="Helvetica Light"/>
+                <a:ea typeface="+mn-ea"/>
+                <a:cs typeface="Helvetica Light"/>
               </a:defRPr>
             </a:lvl1pPr>
+            <a:lvl2pPr marL="800100" indent="-342900" algn="l" defTabSz="914400" rtl="0" eaLnBrk="1" latinLnBrk="0" hangingPunct="1">
+              <a:lnSpc>
+                <a:spcPct val="100000"/>
+              </a:lnSpc>
+              <a:spcBef>
+                <a:spcPts val="500"/>
+              </a:spcBef>
+              <a:buClr>
+                <a:schemeClr val="tx2"/>
+              </a:buClr>
+              <a:buSzPct val="75000"/>
+              <a:buFont typeface="Lucida Grande"/>
+              <a:buChar char="‣"/>
+              <a:defRPr sz="2000" b="0" i="0" kern="1200">
+                <a:solidFill>
+                  <a:schemeClr val="tx2"/>
+                </a:solidFill>
+                <a:latin typeface="Helvetica Light"/>
+                <a:ea typeface="+mn-ea"/>
+                <a:cs typeface="Helvetica Light"/>
+              </a:defRPr>
+            </a:lvl2pPr>
+            <a:lvl3pPr marL="1143000" indent="-228600" algn="l" defTabSz="914400" rtl="0" eaLnBrk="1" latinLnBrk="0" hangingPunct="1">
+              <a:lnSpc>
+                <a:spcPct val="100000"/>
+              </a:lnSpc>
+              <a:spcBef>
+                <a:spcPts val="500"/>
+              </a:spcBef>
+              <a:buClr>
+                <a:schemeClr val="tx2"/>
+              </a:buClr>
+              <a:buSzPct val="75000"/>
+              <a:buFont typeface="Lucida Grande"/>
+              <a:buChar char="‣"/>
+              <a:defRPr sz="1800" b="0" i="0" kern="1200">
+                <a:solidFill>
+                  <a:schemeClr val="tx2"/>
+                </a:solidFill>
+                <a:latin typeface="Helvetica Light"/>
+                <a:ea typeface="+mn-ea"/>
+                <a:cs typeface="Helvetica Light"/>
+              </a:defRPr>
+            </a:lvl3pPr>
+            <a:lvl4pPr marL="1600200" indent="-228600" algn="l" defTabSz="914400" rtl="0" eaLnBrk="1" latinLnBrk="0" hangingPunct="1">
+              <a:lnSpc>
+                <a:spcPct val="100000"/>
+              </a:lnSpc>
+              <a:spcBef>
+                <a:spcPts val="500"/>
+              </a:spcBef>
+              <a:buClr>
+                <a:schemeClr val="tx2"/>
+              </a:buClr>
+              <a:buSzPct val="75000"/>
+              <a:buFont typeface="Lucida Grande"/>
+              <a:buChar char="‣"/>
+              <a:defRPr sz="1600" b="0" i="0" kern="1200">
+                <a:solidFill>
+                  <a:schemeClr val="tx2"/>
+                </a:solidFill>
+                <a:latin typeface="Helvetica Light"/>
+                <a:ea typeface="+mn-ea"/>
+                <a:cs typeface="Helvetica Light"/>
+              </a:defRPr>
+            </a:lvl4pPr>
+            <a:lvl5pPr marL="2057400" indent="-228600" algn="l" defTabSz="914400" rtl="0" eaLnBrk="1" latinLnBrk="0" hangingPunct="1">
+              <a:lnSpc>
+                <a:spcPct val="100000"/>
+              </a:lnSpc>
+              <a:spcBef>
+                <a:spcPts val="500"/>
+              </a:spcBef>
+              <a:buClr>
+                <a:schemeClr val="tx2"/>
+              </a:buClr>
+              <a:buSzPct val="75000"/>
+              <a:buFont typeface="Lucida Grande"/>
+              <a:buChar char="‣"/>
+              <a:defRPr sz="1600" b="0" i="0" kern="1200">
+                <a:solidFill>
+                  <a:schemeClr val="tx2"/>
+                </a:solidFill>
+                <a:latin typeface="Helvetica Light"/>
+                <a:ea typeface="+mn-ea"/>
+                <a:cs typeface="Helvetica Light"/>
+              </a:defRPr>
+            </a:lvl5pPr>
+            <a:lvl6pPr marL="2514600" indent="-228600" algn="l" defTabSz="914400" rtl="0" eaLnBrk="1" latinLnBrk="0" hangingPunct="1">
+              <a:lnSpc>
+                <a:spcPct val="90000"/>
+              </a:lnSpc>
+              <a:spcBef>
+                <a:spcPts val="500"/>
+              </a:spcBef>
+              <a:buFont typeface="Arial" panose="020B0604020202020204" pitchFamily="34" charset="0"/>
+              <a:buChar char="•"/>
+              <a:defRPr sz="1800" kern="1200">
+                <a:solidFill>
+                  <a:schemeClr val="tx1"/>
+                </a:solidFill>
+                <a:latin typeface="+mn-lt"/>
+                <a:ea typeface="+mn-ea"/>
+                <a:cs typeface="+mn-cs"/>
+              </a:defRPr>
+            </a:lvl6pPr>
+            <a:lvl7pPr marL="2971800" indent="-228600" algn="l" defTabSz="914400" rtl="0" eaLnBrk="1" latinLnBrk="0" hangingPunct="1">
+              <a:lnSpc>
+                <a:spcPct val="90000"/>
+              </a:lnSpc>
+              <a:spcBef>
+                <a:spcPts val="500"/>
+              </a:spcBef>
+              <a:buFont typeface="Arial" panose="020B0604020202020204" pitchFamily="34" charset="0"/>
+              <a:buChar char="•"/>
+              <a:defRPr sz="1800" kern="1200">
+                <a:solidFill>
+                  <a:schemeClr val="tx1"/>
+                </a:solidFill>
+                <a:latin typeface="+mn-lt"/>
+                <a:ea typeface="+mn-ea"/>
+                <a:cs typeface="+mn-cs"/>
+              </a:defRPr>
+            </a:lvl7pPr>
+            <a:lvl8pPr marL="3429000" indent="-228600" algn="l" defTabSz="914400" rtl="0" eaLnBrk="1" latinLnBrk="0" hangingPunct="1">
+              <a:lnSpc>
+                <a:spcPct val="90000"/>
+              </a:lnSpc>
+              <a:spcBef>
+                <a:spcPts val="500"/>
+              </a:spcBef>
+              <a:buFont typeface="Arial" panose="020B0604020202020204" pitchFamily="34" charset="0"/>
+              <a:buChar char="•"/>
+              <a:defRPr sz="1800" kern="1200">
+                <a:solidFill>
+                  <a:schemeClr val="tx1"/>
+                </a:solidFill>
+                <a:latin typeface="+mn-lt"/>
+                <a:ea typeface="+mn-ea"/>
+                <a:cs typeface="+mn-cs"/>
+              </a:defRPr>
+            </a:lvl8pPr>
+            <a:lvl9pPr marL="3886200" indent="-228600" algn="l" defTabSz="914400" rtl="0" eaLnBrk="1" latinLnBrk="0" hangingPunct="1">
+              <a:lnSpc>
+                <a:spcPct val="90000"/>
+              </a:lnSpc>
+              <a:spcBef>
+                <a:spcPts val="500"/>
+              </a:spcBef>
+              <a:buFont typeface="Arial" panose="020B0604020202020204" pitchFamily="34" charset="0"/>
+              <a:buChar char="•"/>
+              <a:defRPr sz="1800" kern="1200">
+                <a:solidFill>
+                  <a:schemeClr val="tx1"/>
+                </a:solidFill>
+                <a:latin typeface="+mn-lt"/>
+                <a:ea typeface="+mn-ea"/>
+                <a:cs typeface="+mn-cs"/>
+              </a:defRPr>
+            </a:lvl9pPr>
           </a:lstStyle>
           <a:p>
-            <a:r>
-              <a:rPr lang="en-US" dirty="0" smtClean="0"/>
-              <a:t>Cypher Demo</a:t>
-            </a:r>
-            <a:endParaRPr lang="en-US" dirty="0"/>
+            <a:pPr marL="0" indent="0">
+              <a:buNone/>
+              <a:defRPr sz="1800">
+                <a:solidFill>
+                  <a:srgbClr val="000000"/>
+                </a:solidFill>
+              </a:defRPr>
+            </a:pPr>
+            <a:r>
+              <a:rPr lang="en-US" sz="2800" dirty="0" smtClean="0">
+                <a:solidFill>
+                  <a:srgbClr val="8E8E93"/>
+                </a:solidFill>
+                <a:latin typeface="OCR A Std" panose="020F0609000104060307" pitchFamily="49" charset="0"/>
+                <a:cs typeface="MoolBoran" panose="020B0100010101010101" pitchFamily="34" charset="0"/>
+              </a:rPr>
+              <a:t>( ) – [ ] – ( )</a:t>
+            </a:r>
+          </a:p>
+          <a:p>
+            <a:pPr marL="0" indent="0">
+              <a:buNone/>
+              <a:defRPr sz="1800">
+                <a:solidFill>
+                  <a:srgbClr val="000000"/>
+                </a:solidFill>
+              </a:defRPr>
+            </a:pPr>
+            <a:r>
+              <a:rPr lang="en-US" sz="2800" dirty="0" smtClean="0">
+                <a:solidFill>
+                  <a:srgbClr val="8E8E93"/>
+                </a:solidFill>
+                <a:latin typeface="OCR A Std" panose="020F0609000104060307" pitchFamily="49" charset="0"/>
+                <a:cs typeface="MoolBoran" panose="020B0100010101010101" pitchFamily="34" charset="0"/>
+              </a:rPr>
+              <a:t>( ) – [ ] -&gt; ( )</a:t>
+            </a:r>
+          </a:p>
+          <a:p>
+            <a:pPr marL="0" indent="0">
+              <a:buNone/>
+              <a:defRPr sz="1800">
+                <a:solidFill>
+                  <a:srgbClr val="000000"/>
+                </a:solidFill>
+              </a:defRPr>
+            </a:pPr>
+            <a:r>
+              <a:rPr lang="en-US" sz="2800" dirty="0" smtClean="0">
+                <a:solidFill>
+                  <a:srgbClr val="8E8E93"/>
+                </a:solidFill>
+                <a:latin typeface="OCR A Std" panose="020F0609000104060307" pitchFamily="49" charset="0"/>
+                <a:cs typeface="MoolBoran" panose="020B0100010101010101" pitchFamily="34" charset="0"/>
+              </a:rPr>
+              <a:t>( ) &lt;- [ ] – ( )</a:t>
+            </a:r>
+          </a:p>
+          <a:p>
+            <a:pPr marL="0" indent="0">
+              <a:buNone/>
+              <a:defRPr sz="1800">
+                <a:solidFill>
+                  <a:srgbClr val="000000"/>
+                </a:solidFill>
+              </a:defRPr>
+            </a:pPr>
+            <a:endParaRPr lang="en-US" sz="2800" dirty="0" smtClean="0">
+              <a:solidFill>
+                <a:srgbClr val="8E8E93"/>
+              </a:solidFill>
+              <a:latin typeface="OCR A Std" panose="020F0609000104060307" pitchFamily="49" charset="0"/>
+              <a:cs typeface="MoolBoran" panose="020B0100010101010101" pitchFamily="34" charset="0"/>
+            </a:endParaRPr>
+          </a:p>
+          <a:p>
+            <a:pPr marL="0" indent="0">
+              <a:buNone/>
+              <a:defRPr sz="1800">
+                <a:solidFill>
+                  <a:srgbClr val="000000"/>
+                </a:solidFill>
+              </a:defRPr>
+            </a:pPr>
+            <a:r>
+              <a:rPr lang="en-US" sz="1200" dirty="0" smtClean="0">
+                <a:solidFill>
+                  <a:srgbClr val="8E8E93"/>
+                </a:solidFill>
+                <a:latin typeface="OCR A Std" panose="020F0609000104060307" pitchFamily="49" charset="0"/>
+                <a:cs typeface="MoolBoran" panose="020B0100010101010101" pitchFamily="34" charset="0"/>
+              </a:rPr>
+              <a:t>CREATE (</a:t>
+            </a:r>
+            <a:r>
+              <a:rPr lang="en-US" sz="1200" dirty="0" err="1" smtClean="0">
+                <a:solidFill>
+                  <a:srgbClr val="8E8E93"/>
+                </a:solidFill>
+                <a:latin typeface="OCR A Std" panose="020F0609000104060307" pitchFamily="49" charset="0"/>
+                <a:cs typeface="MoolBoran" panose="020B0100010101010101" pitchFamily="34" charset="0"/>
+              </a:rPr>
+              <a:t>m:Movie</a:t>
+            </a:r>
+            <a:r>
+              <a:rPr lang="en-US" sz="1200" dirty="0" smtClean="0">
+                <a:solidFill>
+                  <a:srgbClr val="8E8E93"/>
+                </a:solidFill>
+                <a:latin typeface="OCR A Std" panose="020F0609000104060307" pitchFamily="49" charset="0"/>
+                <a:cs typeface="MoolBoran" panose="020B0100010101010101" pitchFamily="34" charset="0"/>
+              </a:rPr>
+              <a:t> { name: ‘</a:t>
+            </a:r>
+            <a:r>
+              <a:rPr lang="en-US" sz="1200" dirty="0" err="1" smtClean="0">
+                <a:solidFill>
+                  <a:srgbClr val="8E8E93"/>
+                </a:solidFill>
+                <a:latin typeface="OCR A Std" panose="020F0609000104060307" pitchFamily="49" charset="0"/>
+                <a:cs typeface="MoolBoran" panose="020B0100010101010101" pitchFamily="34" charset="0"/>
+              </a:rPr>
+              <a:t>Deadpool</a:t>
+            </a:r>
+            <a:r>
+              <a:rPr lang="en-US" sz="1200" dirty="0" smtClean="0">
+                <a:solidFill>
+                  <a:srgbClr val="8E8E93"/>
+                </a:solidFill>
+                <a:latin typeface="OCR A Std" panose="020F0609000104060307" pitchFamily="49" charset="0"/>
+                <a:cs typeface="MoolBoran" panose="020B0100010101010101" pitchFamily="34" charset="0"/>
+              </a:rPr>
+              <a:t>’ })</a:t>
+            </a:r>
+          </a:p>
+          <a:p>
+            <a:pPr marL="0" indent="0">
+              <a:buNone/>
+              <a:defRPr sz="1800">
+                <a:solidFill>
+                  <a:srgbClr val="000000"/>
+                </a:solidFill>
+              </a:defRPr>
+            </a:pPr>
+            <a:endParaRPr lang="en-US" sz="1200" dirty="0" smtClean="0">
+              <a:solidFill>
+                <a:srgbClr val="8E8E93"/>
+              </a:solidFill>
+              <a:latin typeface="OCR A Std" panose="020F0609000104060307" pitchFamily="49" charset="0"/>
+              <a:cs typeface="MoolBoran" panose="020B0100010101010101" pitchFamily="34" charset="0"/>
+            </a:endParaRPr>
+          </a:p>
+          <a:p>
+            <a:pPr marL="0" indent="0">
+              <a:buNone/>
+              <a:defRPr sz="1800">
+                <a:solidFill>
+                  <a:srgbClr val="000000"/>
+                </a:solidFill>
+              </a:defRPr>
+            </a:pPr>
+            <a:r>
+              <a:rPr lang="en-US" sz="1200" dirty="0" smtClean="0">
+                <a:solidFill>
+                  <a:srgbClr val="8E8E93"/>
+                </a:solidFill>
+                <a:latin typeface="OCR A Std" panose="020F0609000104060307" pitchFamily="49" charset="0"/>
+                <a:cs typeface="MoolBoran" panose="020B0100010101010101" pitchFamily="34" charset="0"/>
+              </a:rPr>
+              <a:t>MATCH (</a:t>
+            </a:r>
+            <a:r>
+              <a:rPr lang="en-US" sz="1200" dirty="0" err="1" smtClean="0">
+                <a:solidFill>
+                  <a:srgbClr val="8E8E93"/>
+                </a:solidFill>
+                <a:latin typeface="OCR A Std" panose="020F0609000104060307" pitchFamily="49" charset="0"/>
+                <a:cs typeface="MoolBoran" panose="020B0100010101010101" pitchFamily="34" charset="0"/>
+              </a:rPr>
+              <a:t>a:Actor</a:t>
+            </a:r>
+            <a:r>
+              <a:rPr lang="en-US" sz="1200" dirty="0" smtClean="0">
+                <a:solidFill>
+                  <a:srgbClr val="8E8E93"/>
+                </a:solidFill>
+                <a:latin typeface="OCR A Std" panose="020F0609000104060307" pitchFamily="49" charset="0"/>
+                <a:cs typeface="MoolBoran" panose="020B0100010101010101" pitchFamily="34" charset="0"/>
+              </a:rPr>
+              <a:t>)-[</a:t>
+            </a:r>
+            <a:r>
+              <a:rPr lang="en-US" sz="1200" dirty="0" err="1" smtClean="0">
+                <a:solidFill>
+                  <a:srgbClr val="8E8E93"/>
+                </a:solidFill>
+                <a:latin typeface="OCR A Std" panose="020F0609000104060307" pitchFamily="49" charset="0"/>
+                <a:cs typeface="MoolBoran" panose="020B0100010101010101" pitchFamily="34" charset="0"/>
+              </a:rPr>
+              <a:t>r:ACTED_IN</a:t>
+            </a:r>
+            <a:r>
+              <a:rPr lang="en-US" sz="1200" dirty="0" smtClean="0">
+                <a:solidFill>
+                  <a:srgbClr val="8E8E93"/>
+                </a:solidFill>
+                <a:latin typeface="OCR A Std" panose="020F0609000104060307" pitchFamily="49" charset="0"/>
+                <a:cs typeface="MoolBoran" panose="020B0100010101010101" pitchFamily="34" charset="0"/>
+              </a:rPr>
+              <a:t>]-&gt;(</a:t>
+            </a:r>
+            <a:r>
+              <a:rPr lang="en-US" sz="1200" dirty="0" err="1" smtClean="0">
+                <a:solidFill>
+                  <a:srgbClr val="8E8E93"/>
+                </a:solidFill>
+                <a:latin typeface="OCR A Std" panose="020F0609000104060307" pitchFamily="49" charset="0"/>
+                <a:cs typeface="MoolBoran" panose="020B0100010101010101" pitchFamily="34" charset="0"/>
+              </a:rPr>
+              <a:t>m:Movie</a:t>
+            </a:r>
+            <a:r>
+              <a:rPr lang="en-US" sz="1200" dirty="0" smtClean="0">
+                <a:solidFill>
+                  <a:srgbClr val="8E8E93"/>
+                </a:solidFill>
+                <a:latin typeface="OCR A Std" panose="020F0609000104060307" pitchFamily="49" charset="0"/>
+                <a:cs typeface="MoolBoran" panose="020B0100010101010101" pitchFamily="34" charset="0"/>
+              </a:rPr>
+              <a:t>)</a:t>
+            </a:r>
+          </a:p>
+          <a:p>
+            <a:pPr marL="0" indent="0">
+              <a:buNone/>
+              <a:defRPr sz="1800">
+                <a:solidFill>
+                  <a:srgbClr val="000000"/>
+                </a:solidFill>
+              </a:defRPr>
+            </a:pPr>
+            <a:r>
+              <a:rPr lang="en-US" sz="1200" dirty="0" smtClean="0">
+                <a:solidFill>
+                  <a:srgbClr val="8E8E93"/>
+                </a:solidFill>
+                <a:latin typeface="OCR A Std" panose="020F0609000104060307" pitchFamily="49" charset="0"/>
+                <a:cs typeface="MoolBoran" panose="020B0100010101010101" pitchFamily="34" charset="0"/>
+              </a:rPr>
+              <a:t>WHERE </a:t>
+            </a:r>
+            <a:r>
+              <a:rPr lang="en-US" sz="1200" dirty="0" err="1" smtClean="0">
+                <a:solidFill>
+                  <a:srgbClr val="8E8E93"/>
+                </a:solidFill>
+                <a:latin typeface="OCR A Std" panose="020F0609000104060307" pitchFamily="49" charset="0"/>
+                <a:cs typeface="MoolBoran" panose="020B0100010101010101" pitchFamily="34" charset="0"/>
+              </a:rPr>
+              <a:t>m.Movie</a:t>
+            </a:r>
+            <a:r>
+              <a:rPr lang="en-US" sz="1200" dirty="0" smtClean="0">
+                <a:solidFill>
+                  <a:srgbClr val="8E8E93"/>
+                </a:solidFill>
+                <a:latin typeface="OCR A Std" panose="020F0609000104060307" pitchFamily="49" charset="0"/>
+                <a:cs typeface="MoolBoran" panose="020B0100010101010101" pitchFamily="34" charset="0"/>
+              </a:rPr>
+              <a:t> = ‘</a:t>
+            </a:r>
+            <a:r>
+              <a:rPr lang="en-US" sz="1200" dirty="0" err="1" smtClean="0">
+                <a:solidFill>
+                  <a:srgbClr val="8E8E93"/>
+                </a:solidFill>
+                <a:latin typeface="OCR A Std" panose="020F0609000104060307" pitchFamily="49" charset="0"/>
+                <a:cs typeface="MoolBoran" panose="020B0100010101010101" pitchFamily="34" charset="0"/>
+              </a:rPr>
+              <a:t>Deadpool</a:t>
+            </a:r>
+            <a:r>
+              <a:rPr lang="en-US" sz="1200" dirty="0" smtClean="0">
+                <a:solidFill>
+                  <a:srgbClr val="8E8E93"/>
+                </a:solidFill>
+                <a:latin typeface="OCR A Std" panose="020F0609000104060307" pitchFamily="49" charset="0"/>
+                <a:cs typeface="MoolBoran" panose="020B0100010101010101" pitchFamily="34" charset="0"/>
+              </a:rPr>
+              <a:t>’</a:t>
+            </a:r>
+            <a:endParaRPr lang="en-US" sz="1200" dirty="0">
+              <a:solidFill>
+                <a:srgbClr val="8E8E93"/>
+              </a:solidFill>
+              <a:latin typeface="OCR A Std" panose="020F0609000104060307" pitchFamily="49" charset="0"/>
+              <a:cs typeface="MoolBoran" panose="020B0100010101010101" pitchFamily="34" charset="0"/>
+            </a:endParaRPr>
+          </a:p>
+          <a:p>
+            <a:pPr marL="0" indent="0">
+              <a:buNone/>
+              <a:defRPr sz="1800">
+                <a:solidFill>
+                  <a:srgbClr val="000000"/>
+                </a:solidFill>
+              </a:defRPr>
+            </a:pPr>
+            <a:r>
+              <a:rPr lang="en-US" sz="1200" dirty="0" smtClean="0">
+                <a:solidFill>
+                  <a:srgbClr val="8E8E93"/>
+                </a:solidFill>
+                <a:latin typeface="OCR A Std" panose="020F0609000104060307" pitchFamily="49" charset="0"/>
+                <a:cs typeface="MoolBoran" panose="020B0100010101010101" pitchFamily="34" charset="0"/>
+              </a:rPr>
+              <a:t>RETURN a, r, m</a:t>
+            </a:r>
           </a:p>
         </p:txBody>
       </p:sp>
     </p:spTree>
     <p:extLst>
       <p:ext uri="{BB962C8B-B14F-4D97-AF65-F5344CB8AC3E}">
-        <p14:creationId xmlns:p14="http://schemas.microsoft.com/office/powerpoint/2010/main" val="4009832948"/>
+        <p14:creationId xmlns:p14="http://schemas.microsoft.com/office/powerpoint/2010/main" val="309578627"/>
       </p:ext>
     </p:extLst>
   </p:cSld>
@@ -11404,6 +12275,30 @@
           <a:chExt cx="0" cy="0"/>
         </a:xfrm>
       </p:grpSpPr>
+      <p:pic>
+        <p:nvPicPr>
+          <p:cNvPr id="5" name="Picture 4"/>
+          <p:cNvPicPr>
+            <a:picLocks noChangeAspect="1"/>
+          </p:cNvPicPr>
+          <p:nvPr/>
+        </p:nvPicPr>
+        <p:blipFill>
+          <a:blip r:embed="rId3"/>
+          <a:stretch>
+            <a:fillRect/>
+          </a:stretch>
+        </p:blipFill>
+        <p:spPr>
+          <a:xfrm>
+            <a:off x="3133319" y="1782726"/>
+            <a:ext cx="5811061" cy="3248478"/>
+          </a:xfrm>
+          <a:prstGeom prst="rect">
+            <a:avLst/>
+          </a:prstGeom>
+        </p:spPr>
+      </p:pic>
       <p:sp>
         <p:nvSpPr>
           <p:cNvPr id="8" name="Title 1"/>
@@ -11448,64 +12343,16 @@
           <a:p>
             <a:r>
               <a:rPr lang="en-US" dirty="0" smtClean="0"/>
-              <a:t>Schema Rigidity</a:t>
+              <a:t>Cypher Demo</a:t>
             </a:r>
             <a:endParaRPr lang="en-US" dirty="0"/>
           </a:p>
         </p:txBody>
       </p:sp>
-      <p:pic>
-        <p:nvPicPr>
-          <p:cNvPr id="2" name="Picture 1"/>
-          <p:cNvPicPr>
-            <a:picLocks noChangeAspect="1"/>
-          </p:cNvPicPr>
-          <p:nvPr/>
-        </p:nvPicPr>
-        <p:blipFill>
-          <a:blip r:embed="rId3"/>
-          <a:stretch>
-            <a:fillRect/>
-          </a:stretch>
-        </p:blipFill>
-        <p:spPr>
-          <a:xfrm>
-            <a:off x="5836354" y="906137"/>
-            <a:ext cx="5643222" cy="5087039"/>
-          </a:xfrm>
-          <a:prstGeom prst="rect">
-            <a:avLst/>
-          </a:prstGeom>
-        </p:spPr>
-      </p:pic>
-      <p:pic>
-        <p:nvPicPr>
-          <p:cNvPr id="3" name="Picture 2"/>
-          <p:cNvPicPr>
-            <a:picLocks noChangeAspect="1"/>
-          </p:cNvPicPr>
-          <p:nvPr/>
-        </p:nvPicPr>
-        <p:blipFill>
-          <a:blip r:embed="rId4"/>
-          <a:stretch>
-            <a:fillRect/>
-          </a:stretch>
-        </p:blipFill>
-        <p:spPr>
-          <a:xfrm>
-            <a:off x="307152" y="1290723"/>
-            <a:ext cx="5036029" cy="4554730"/>
-          </a:xfrm>
-          <a:prstGeom prst="rect">
-            <a:avLst/>
-          </a:prstGeom>
-        </p:spPr>
-      </p:pic>
     </p:spTree>
     <p:extLst>
       <p:ext uri="{BB962C8B-B14F-4D97-AF65-F5344CB8AC3E}">
-        <p14:creationId xmlns:p14="http://schemas.microsoft.com/office/powerpoint/2010/main" val="864925281"/>
+        <p14:creationId xmlns:p14="http://schemas.microsoft.com/office/powerpoint/2010/main" val="4009832948"/>
       </p:ext>
     </p:extLst>
   </p:cSld>
@@ -11586,6 +12433,144 @@
           <a:p>
             <a:r>
               <a:rPr lang="en-US" dirty="0" smtClean="0"/>
+              <a:t>Schema Rigidity</a:t>
+            </a:r>
+            <a:endParaRPr lang="en-US" dirty="0"/>
+          </a:p>
+        </p:txBody>
+      </p:sp>
+      <p:pic>
+        <p:nvPicPr>
+          <p:cNvPr id="2" name="Picture 1"/>
+          <p:cNvPicPr>
+            <a:picLocks noChangeAspect="1"/>
+          </p:cNvPicPr>
+          <p:nvPr/>
+        </p:nvPicPr>
+        <p:blipFill>
+          <a:blip r:embed="rId3"/>
+          <a:stretch>
+            <a:fillRect/>
+          </a:stretch>
+        </p:blipFill>
+        <p:spPr>
+          <a:xfrm>
+            <a:off x="5836354" y="906137"/>
+            <a:ext cx="5643222" cy="5087039"/>
+          </a:xfrm>
+          <a:prstGeom prst="rect">
+            <a:avLst/>
+          </a:prstGeom>
+        </p:spPr>
+      </p:pic>
+      <p:pic>
+        <p:nvPicPr>
+          <p:cNvPr id="3" name="Picture 2"/>
+          <p:cNvPicPr>
+            <a:picLocks noChangeAspect="1"/>
+          </p:cNvPicPr>
+          <p:nvPr/>
+        </p:nvPicPr>
+        <p:blipFill>
+          <a:blip r:embed="rId4"/>
+          <a:stretch>
+            <a:fillRect/>
+          </a:stretch>
+        </p:blipFill>
+        <p:spPr>
+          <a:xfrm>
+            <a:off x="307152" y="1290723"/>
+            <a:ext cx="5036029" cy="4554730"/>
+          </a:xfrm>
+          <a:prstGeom prst="rect">
+            <a:avLst/>
+          </a:prstGeom>
+        </p:spPr>
+      </p:pic>
+    </p:spTree>
+    <p:extLst>
+      <p:ext uri="{BB962C8B-B14F-4D97-AF65-F5344CB8AC3E}">
+        <p14:creationId xmlns:p14="http://schemas.microsoft.com/office/powerpoint/2010/main" val="864925281"/>
+      </p:ext>
+    </p:extLst>
+  </p:cSld>
+  <p:clrMapOvr>
+    <a:masterClrMapping/>
+  </p:clrMapOvr>
+  <p:transition spd="slow">
+    <p:fade thruBlk="1"/>
+  </p:transition>
+  <p:timing>
+    <p:tnLst>
+      <p:par>
+        <p:cTn id="1" dur="indefinite" restart="never" nodeType="tmRoot"/>
+      </p:par>
+    </p:tnLst>
+  </p:timing>
+</p:sld>
+</file>
+
+<file path=ppt/slides/slide17.xml><?xml version="1.0" encoding="utf-8"?>
+<p:sld xmlns:a="http://schemas.openxmlformats.org/drawingml/2006/main" xmlns:r="http://schemas.openxmlformats.org/officeDocument/2006/relationships" xmlns:p="http://schemas.openxmlformats.org/presentationml/2006/main">
+  <p:cSld>
+    <p:spTree>
+      <p:nvGrpSpPr>
+        <p:cNvPr id="1" name=""/>
+        <p:cNvGrpSpPr/>
+        <p:nvPr/>
+      </p:nvGrpSpPr>
+      <p:grpSpPr>
+        <a:xfrm>
+          <a:off x="0" y="0"/>
+          <a:ext cx="0" cy="0"/>
+          <a:chOff x="0" y="0"/>
+          <a:chExt cx="0" cy="0"/>
+        </a:xfrm>
+      </p:grpSpPr>
+      <p:sp>
+        <p:nvSpPr>
+          <p:cNvPr id="8" name="Title 1"/>
+          <p:cNvSpPr txBox="1">
+            <a:spLocks/>
+          </p:cNvSpPr>
+          <p:nvPr/>
+        </p:nvSpPr>
+        <p:spPr>
+          <a:xfrm>
+            <a:off x="457200" y="228600"/>
+            <a:ext cx="10287000" cy="914400"/>
+          </a:xfrm>
+          <a:prstGeom prst="rect">
+            <a:avLst/>
+          </a:prstGeom>
+        </p:spPr>
+        <p:txBody>
+          <a:bodyPr vert="horz" lIns="91440" tIns="45720" rIns="91440" bIns="45720" rtlCol="0" anchor="ctr">
+            <a:normAutofit/>
+          </a:bodyPr>
+          <a:lstStyle>
+            <a:lvl1pPr algn="l" defTabSz="412740" rtl="0" eaLnBrk="1" latinLnBrk="0" hangingPunct="1">
+              <a:lnSpc>
+                <a:spcPct val="100000"/>
+              </a:lnSpc>
+              <a:spcBef>
+                <a:spcPct val="0"/>
+              </a:spcBef>
+              <a:buNone/>
+              <a:defRPr lang="en-US" sz="3600" b="1" i="0" kern="1200" spc="-72" dirty="0">
+                <a:solidFill>
+                  <a:schemeClr val="tx1"/>
+                </a:solidFill>
+                <a:latin typeface="Helvetica"/>
+                <a:ea typeface="+mj-ea"/>
+                <a:cs typeface="Helvetica"/>
+                <a:sym typeface="Helvetica"/>
+              </a:defRPr>
+            </a:lvl1pPr>
+          </a:lstStyle>
+          <a:p>
+            <a:r>
+              <a:rPr lang="en-US" dirty="0" smtClean="0"/>
               <a:t>Other Thoughts</a:t>
             </a:r>
             <a:endParaRPr lang="en-US" dirty="0"/>
@@ -11821,7 +12806,7 @@
 </p:sld>
 </file>
 
-<file path=ppt/slides/slide17.xml><?xml version="1.0" encoding="utf-8"?>
+<file path=ppt/slides/slide18.xml><?xml version="1.0" encoding="utf-8"?>
 <p:sld xmlns:a="http://schemas.openxmlformats.org/drawingml/2006/main" xmlns:r="http://schemas.openxmlformats.org/officeDocument/2006/relationships" xmlns:p="http://schemas.openxmlformats.org/presentationml/2006/main">
   <p:cSld>
     <p:spTree>
@@ -11981,7 +12966,15 @@
             </a:pPr>
             <a:r>
               <a:rPr lang="en-US" dirty="0" smtClean="0"/>
-              <a:t>OK I get it, but how do I actually implement it?</a:t>
+              <a:t>OK I get it, but how do I actually </a:t>
+            </a:r>
+            <a:r>
+              <a:rPr lang="en-US" dirty="0" smtClean="0"/>
+              <a:t>use it</a:t>
+            </a:r>
+            <a:r>
+              <a:rPr lang="en-US" dirty="0" smtClean="0"/>
+              <a:t>?</a:t>
             </a:r>
             <a:endParaRPr lang="en-US" dirty="0"/>
           </a:p>
@@ -15944,9 +16937,337 @@
   <p:timing>
     <p:tnLst>
       <p:par>
-        <p:cTn id="1" dur="indefinite" restart="never" nodeType="tmRoot"/>
+        <p:cTn id="1" dur="indefinite" restart="never" nodeType="tmRoot">
+          <p:childTnLst>
+            <p:seq concurrent="1" nextAc="seek">
+              <p:cTn id="2" dur="indefinite" nodeType="mainSeq">
+                <p:childTnLst>
+                  <p:par>
+                    <p:cTn id="3" fill="hold">
+                      <p:stCondLst>
+                        <p:cond delay="indefinite"/>
+                      </p:stCondLst>
+                      <p:childTnLst>
+                        <p:par>
+                          <p:cTn id="4" fill="hold">
+                            <p:stCondLst>
+                              <p:cond delay="0"/>
+                            </p:stCondLst>
+                            <p:childTnLst>
+                              <p:par>
+                                <p:cTn id="5" presetID="10" presetClass="entr" presetSubtype="0" fill="hold" nodeType="clickEffect">
+                                  <p:stCondLst>
+                                    <p:cond delay="0"/>
+                                  </p:stCondLst>
+                                  <p:childTnLst>
+                                    <p:set>
+                                      <p:cBhvr>
+                                        <p:cTn id="6" dur="1" fill="hold">
+                                          <p:stCondLst>
+                                            <p:cond delay="0"/>
+                                          </p:stCondLst>
+                                        </p:cTn>
+                                        <p:tgtEl>
+                                          <p:spTgt spid="4"/>
+                                        </p:tgtEl>
+                                        <p:attrNameLst>
+                                          <p:attrName>style.visibility</p:attrName>
+                                        </p:attrNameLst>
+                                      </p:cBhvr>
+                                      <p:to>
+                                        <p:strVal val="visible"/>
+                                      </p:to>
+                                    </p:set>
+                                    <p:animEffect transition="in" filter="fade">
+                                      <p:cBhvr>
+                                        <p:cTn id="7" dur="500"/>
+                                        <p:tgtEl>
+                                          <p:spTgt spid="4"/>
+                                        </p:tgtEl>
+                                      </p:cBhvr>
+                                    </p:animEffect>
+                                  </p:childTnLst>
+                                </p:cTn>
+                              </p:par>
+                              <p:par>
+                                <p:cTn id="8" presetID="10" presetClass="entr" presetSubtype="0" fill="hold" grpId="0" nodeType="withEffect">
+                                  <p:stCondLst>
+                                    <p:cond delay="0"/>
+                                  </p:stCondLst>
+                                  <p:childTnLst>
+                                    <p:set>
+                                      <p:cBhvr>
+                                        <p:cTn id="9" dur="1" fill="hold">
+                                          <p:stCondLst>
+                                            <p:cond delay="0"/>
+                                          </p:stCondLst>
+                                        </p:cTn>
+                                        <p:tgtEl>
+                                          <p:spTgt spid="9"/>
+                                        </p:tgtEl>
+                                        <p:attrNameLst>
+                                          <p:attrName>style.visibility</p:attrName>
+                                        </p:attrNameLst>
+                                      </p:cBhvr>
+                                      <p:to>
+                                        <p:strVal val="visible"/>
+                                      </p:to>
+                                    </p:set>
+                                    <p:animEffect transition="in" filter="fade">
+                                      <p:cBhvr>
+                                        <p:cTn id="10" dur="500"/>
+                                        <p:tgtEl>
+                                          <p:spTgt spid="9"/>
+                                        </p:tgtEl>
+                                      </p:cBhvr>
+                                    </p:animEffect>
+                                  </p:childTnLst>
+                                </p:cTn>
+                              </p:par>
+                              <p:par>
+                                <p:cTn id="11" presetID="10" presetClass="entr" presetSubtype="0" fill="hold" grpId="0" nodeType="withEffect">
+                                  <p:stCondLst>
+                                    <p:cond delay="0"/>
+                                  </p:stCondLst>
+                                  <p:childTnLst>
+                                    <p:set>
+                                      <p:cBhvr>
+                                        <p:cTn id="12" dur="1" fill="hold">
+                                          <p:stCondLst>
+                                            <p:cond delay="0"/>
+                                          </p:stCondLst>
+                                        </p:cTn>
+                                        <p:tgtEl>
+                                          <p:spTgt spid="12"/>
+                                        </p:tgtEl>
+                                        <p:attrNameLst>
+                                          <p:attrName>style.visibility</p:attrName>
+                                        </p:attrNameLst>
+                                      </p:cBhvr>
+                                      <p:to>
+                                        <p:strVal val="visible"/>
+                                      </p:to>
+                                    </p:set>
+                                    <p:animEffect transition="in" filter="fade">
+                                      <p:cBhvr>
+                                        <p:cTn id="13" dur="500"/>
+                                        <p:tgtEl>
+                                          <p:spTgt spid="12"/>
+                                        </p:tgtEl>
+                                      </p:cBhvr>
+                                    </p:animEffect>
+                                  </p:childTnLst>
+                                </p:cTn>
+                              </p:par>
+                            </p:childTnLst>
+                          </p:cTn>
+                        </p:par>
+                      </p:childTnLst>
+                    </p:cTn>
+                  </p:par>
+                  <p:par>
+                    <p:cTn id="14" fill="hold">
+                      <p:stCondLst>
+                        <p:cond delay="indefinite"/>
+                      </p:stCondLst>
+                      <p:childTnLst>
+                        <p:par>
+                          <p:cTn id="15" fill="hold">
+                            <p:stCondLst>
+                              <p:cond delay="0"/>
+                            </p:stCondLst>
+                            <p:childTnLst>
+                              <p:par>
+                                <p:cTn id="16" presetID="10" presetClass="entr" presetSubtype="0" fill="hold" nodeType="clickEffect">
+                                  <p:stCondLst>
+                                    <p:cond delay="0"/>
+                                  </p:stCondLst>
+                                  <p:childTnLst>
+                                    <p:set>
+                                      <p:cBhvr>
+                                        <p:cTn id="17" dur="1" fill="hold">
+                                          <p:stCondLst>
+                                            <p:cond delay="0"/>
+                                          </p:stCondLst>
+                                        </p:cTn>
+                                        <p:tgtEl>
+                                          <p:spTgt spid="7"/>
+                                        </p:tgtEl>
+                                        <p:attrNameLst>
+                                          <p:attrName>style.visibility</p:attrName>
+                                        </p:attrNameLst>
+                                      </p:cBhvr>
+                                      <p:to>
+                                        <p:strVal val="visible"/>
+                                      </p:to>
+                                    </p:set>
+                                    <p:animEffect transition="in" filter="fade">
+                                      <p:cBhvr>
+                                        <p:cTn id="18" dur="500"/>
+                                        <p:tgtEl>
+                                          <p:spTgt spid="7"/>
+                                        </p:tgtEl>
+                                      </p:cBhvr>
+                                    </p:animEffect>
+                                  </p:childTnLst>
+                                </p:cTn>
+                              </p:par>
+                            </p:childTnLst>
+                          </p:cTn>
+                        </p:par>
+                      </p:childTnLst>
+                    </p:cTn>
+                  </p:par>
+                  <p:par>
+                    <p:cTn id="19" fill="hold">
+                      <p:stCondLst>
+                        <p:cond delay="indefinite"/>
+                      </p:stCondLst>
+                      <p:childTnLst>
+                        <p:par>
+                          <p:cTn id="20" fill="hold">
+                            <p:stCondLst>
+                              <p:cond delay="0"/>
+                            </p:stCondLst>
+                            <p:childTnLst>
+                              <p:par>
+                                <p:cTn id="21" presetID="10" presetClass="entr" presetSubtype="0" fill="hold" nodeType="clickEffect">
+                                  <p:stCondLst>
+                                    <p:cond delay="0"/>
+                                  </p:stCondLst>
+                                  <p:childTnLst>
+                                    <p:set>
+                                      <p:cBhvr>
+                                        <p:cTn id="22" dur="1" fill="hold">
+                                          <p:stCondLst>
+                                            <p:cond delay="0"/>
+                                          </p:stCondLst>
+                                        </p:cTn>
+                                        <p:tgtEl>
+                                          <p:spTgt spid="6"/>
+                                        </p:tgtEl>
+                                        <p:attrNameLst>
+                                          <p:attrName>style.visibility</p:attrName>
+                                        </p:attrNameLst>
+                                      </p:cBhvr>
+                                      <p:to>
+                                        <p:strVal val="visible"/>
+                                      </p:to>
+                                    </p:set>
+                                    <p:animEffect transition="in" filter="fade">
+                                      <p:cBhvr>
+                                        <p:cTn id="23" dur="500"/>
+                                        <p:tgtEl>
+                                          <p:spTgt spid="6"/>
+                                        </p:tgtEl>
+                                      </p:cBhvr>
+                                    </p:animEffect>
+                                  </p:childTnLst>
+                                </p:cTn>
+                              </p:par>
+                              <p:par>
+                                <p:cTn id="24" presetID="10" presetClass="entr" presetSubtype="0" fill="hold" grpId="0" nodeType="withEffect">
+                                  <p:stCondLst>
+                                    <p:cond delay="0"/>
+                                  </p:stCondLst>
+                                  <p:childTnLst>
+                                    <p:set>
+                                      <p:cBhvr>
+                                        <p:cTn id="25" dur="1" fill="hold">
+                                          <p:stCondLst>
+                                            <p:cond delay="0"/>
+                                          </p:stCondLst>
+                                        </p:cTn>
+                                        <p:tgtEl>
+                                          <p:spTgt spid="10"/>
+                                        </p:tgtEl>
+                                        <p:attrNameLst>
+                                          <p:attrName>style.visibility</p:attrName>
+                                        </p:attrNameLst>
+                                      </p:cBhvr>
+                                      <p:to>
+                                        <p:strVal val="visible"/>
+                                      </p:to>
+                                    </p:set>
+                                    <p:animEffect transition="in" filter="fade">
+                                      <p:cBhvr>
+                                        <p:cTn id="26" dur="500"/>
+                                        <p:tgtEl>
+                                          <p:spTgt spid="10"/>
+                                        </p:tgtEl>
+                                      </p:cBhvr>
+                                    </p:animEffect>
+                                  </p:childTnLst>
+                                </p:cTn>
+                              </p:par>
+                              <p:par>
+                                <p:cTn id="27" presetID="10" presetClass="entr" presetSubtype="0" fill="hold" grpId="0" nodeType="withEffect">
+                                  <p:stCondLst>
+                                    <p:cond delay="0"/>
+                                  </p:stCondLst>
+                                  <p:childTnLst>
+                                    <p:set>
+                                      <p:cBhvr>
+                                        <p:cTn id="28" dur="1" fill="hold">
+                                          <p:stCondLst>
+                                            <p:cond delay="0"/>
+                                          </p:stCondLst>
+                                        </p:cTn>
+                                        <p:tgtEl>
+                                          <p:spTgt spid="11"/>
+                                        </p:tgtEl>
+                                        <p:attrNameLst>
+                                          <p:attrName>style.visibility</p:attrName>
+                                        </p:attrNameLst>
+                                      </p:cBhvr>
+                                      <p:to>
+                                        <p:strVal val="visible"/>
+                                      </p:to>
+                                    </p:set>
+                                    <p:animEffect transition="in" filter="fade">
+                                      <p:cBhvr>
+                                        <p:cTn id="29" dur="500"/>
+                                        <p:tgtEl>
+                                          <p:spTgt spid="11"/>
+                                        </p:tgtEl>
+                                      </p:cBhvr>
+                                    </p:animEffect>
+                                  </p:childTnLst>
+                                </p:cTn>
+                              </p:par>
+                            </p:childTnLst>
+                          </p:cTn>
+                        </p:par>
+                      </p:childTnLst>
+                    </p:cTn>
+                  </p:par>
+                </p:childTnLst>
+              </p:cTn>
+              <p:prevCondLst>
+                <p:cond evt="onPrev" delay="0">
+                  <p:tgtEl>
+                    <p:sldTgt/>
+                  </p:tgtEl>
+                </p:cond>
+              </p:prevCondLst>
+              <p:nextCondLst>
+                <p:cond evt="onNext" delay="0">
+                  <p:tgtEl>
+                    <p:sldTgt/>
+                  </p:tgtEl>
+                </p:cond>
+              </p:nextCondLst>
+            </p:seq>
+          </p:childTnLst>
+        </p:cTn>
       </p:par>
     </p:tnLst>
+    <p:bldLst>
+      <p:bldP spid="9" grpId="0"/>
+      <p:bldP spid="10" grpId="0"/>
+      <p:bldP spid="11" grpId="0"/>
+      <p:bldP spid="12" grpId="0"/>
+    </p:bldLst>
   </p:timing>
 </p:sld>
 </file>
@@ -18716,12 +20037,11 @@
 </file>
 
 <file path=customXml/item1.xml><?xml version="1.0" encoding="utf-8"?>
-<?mso-contentType ?>
-<FormTemplates xmlns="http://schemas.microsoft.com/sharepoint/v3/contenttype/forms">
-  <Display>DocumentLibraryForm</Display>
-  <Edit>DocumentLibraryForm</Edit>
-  <New>DocumentLibraryForm</New>
-</FormTemplates>
+<p:properties xmlns:p="http://schemas.microsoft.com/office/2006/metadata/properties" xmlns:xsi="http://www.w3.org/2001/XMLSchema-instance" xmlns:pc="http://schemas.microsoft.com/office/infopath/2007/PartnerControls">
+  <documentManagement>
+    <Tag xmlns="47924224-c5f2-456a-9f7d-6fd807247f0f">Official Rightpoint Master Deck</Tag>
+  </documentManagement>
+</p:properties>
 </file>
 
 <file path=customXml/item2.xml><?xml version="1.0" encoding="utf-8"?>
@@ -18735,11 +20055,12 @@
 </file>
 
 <file path=customXml/item3.xml><?xml version="1.0" encoding="utf-8"?>
-<p:properties xmlns:p="http://schemas.microsoft.com/office/2006/metadata/properties" xmlns:xsi="http://www.w3.org/2001/XMLSchema-instance" xmlns:pc="http://schemas.microsoft.com/office/infopath/2007/PartnerControls">
-  <documentManagement>
-    <Tag xmlns="47924224-c5f2-456a-9f7d-6fd807247f0f">Official Rightpoint Master Deck</Tag>
-  </documentManagement>
-</p:properties>
+<?mso-contentType ?>
+<FormTemplates xmlns="http://schemas.microsoft.com/sharepoint/v3/contenttype/forms">
+  <Display>DocumentLibraryForm</Display>
+  <Edit>DocumentLibraryForm</Edit>
+  <New>DocumentLibraryForm</New>
+</FormTemplates>
 </file>
 
 <file path=customXml/item4.xml><?xml version="1.0" encoding="utf-8"?>
@@ -18885,9 +20206,17 @@
 </file>
 
 <file path=customXml/itemProps1.xml><?xml version="1.0" encoding="utf-8"?>
-<ds:datastoreItem xmlns:ds="http://schemas.openxmlformats.org/officeDocument/2006/customXml" ds:itemID="{8231F402-6FCD-4E70-A9F0-17E855A32A30}">
+<ds:datastoreItem xmlns:ds="http://schemas.openxmlformats.org/officeDocument/2006/customXml" ds:itemID="{70378EB2-3903-40D7-BBC9-3720628F379E}">
   <ds:schemaRefs>
-    <ds:schemaRef ds:uri="http://schemas.microsoft.com/sharepoint/v3/contenttype/forms"/>
+    <ds:schemaRef ds:uri="http://schemas.microsoft.com/office/infopath/2007/PartnerControls"/>
+    <ds:schemaRef ds:uri="47924224-c5f2-456a-9f7d-6fd807247f0f"/>
+    <ds:schemaRef ds:uri="http://schemas.microsoft.com/office/2006/documentManagement/types"/>
+    <ds:schemaRef ds:uri="http://schemas.microsoft.com/office/2006/metadata/properties"/>
+    <ds:schemaRef ds:uri="http://purl.org/dc/terms/"/>
+    <ds:schemaRef ds:uri="http://schemas.openxmlformats.org/package/2006/metadata/core-properties"/>
+    <ds:schemaRef ds:uri="http://purl.org/dc/dcmitype/"/>
+    <ds:schemaRef ds:uri="http://www.w3.org/XML/1998/namespace"/>
+    <ds:schemaRef ds:uri="http://purl.org/dc/elements/1.1/"/>
   </ds:schemaRefs>
 </ds:datastoreItem>
 </file>
@@ -18901,17 +20230,9 @@
 </file>
 
 <file path=customXml/itemProps3.xml><?xml version="1.0" encoding="utf-8"?>
-<ds:datastoreItem xmlns:ds="http://schemas.openxmlformats.org/officeDocument/2006/customXml" ds:itemID="{70378EB2-3903-40D7-BBC9-3720628F379E}">
+<ds:datastoreItem xmlns:ds="http://schemas.openxmlformats.org/officeDocument/2006/customXml" ds:itemID="{8231F402-6FCD-4E70-A9F0-17E855A32A30}">
   <ds:schemaRefs>
-    <ds:schemaRef ds:uri="http://schemas.microsoft.com/office/infopath/2007/PartnerControls"/>
-    <ds:schemaRef ds:uri="47924224-c5f2-456a-9f7d-6fd807247f0f"/>
-    <ds:schemaRef ds:uri="http://schemas.microsoft.com/office/2006/documentManagement/types"/>
-    <ds:schemaRef ds:uri="http://schemas.microsoft.com/office/2006/metadata/properties"/>
-    <ds:schemaRef ds:uri="http://purl.org/dc/terms/"/>
-    <ds:schemaRef ds:uri="http://schemas.openxmlformats.org/package/2006/metadata/core-properties"/>
-    <ds:schemaRef ds:uri="http://purl.org/dc/dcmitype/"/>
-    <ds:schemaRef ds:uri="http://www.w3.org/XML/1998/namespace"/>
-    <ds:schemaRef ds:uri="http://purl.org/dc/elements/1.1/"/>
+    <ds:schemaRef ds:uri="http://schemas.microsoft.com/sharepoint/v3/contenttype/forms"/>
   </ds:schemaRefs>
 </ds:datastoreItem>
 </file>

</xml_diff>